<commit_message>
Modified. and A Slideshow added.
Signed-off-by: iconstudio <yoyofa2@hotmail.com>
</commit_message>
<xml_diff>
--- a/slides/2016180042_진윤성_2DGP_1차발표.pptx
+++ b/slides/2016180042_진윤성_2DGP_1차발표.pptx
@@ -5,70 +5,68 @@
     <p:sldMasterId id="2147484044" r:id="rId1"/>
   </p:sldMasterIdLst>
   <p:notesMasterIdLst>
-    <p:notesMasterId r:id="rId16"/>
+    <p:notesMasterId r:id="rId14"/>
   </p:notesMasterIdLst>
   <p:handoutMasterIdLst>
-    <p:handoutMasterId r:id="rId17"/>
+    <p:handoutMasterId r:id="rId15"/>
   </p:handoutMasterIdLst>
   <p:sldIdLst>
     <p:sldId id="256" r:id="rId2"/>
     <p:sldId id="257" r:id="rId3"/>
     <p:sldId id="261" r:id="rId4"/>
-    <p:sldId id="259" r:id="rId5"/>
-    <p:sldId id="276" r:id="rId6"/>
-    <p:sldId id="279" r:id="rId7"/>
-    <p:sldId id="277" r:id="rId8"/>
-    <p:sldId id="268" r:id="rId9"/>
-    <p:sldId id="267" r:id="rId10"/>
-    <p:sldId id="270" r:id="rId11"/>
-    <p:sldId id="271" r:id="rId12"/>
-    <p:sldId id="275" r:id="rId13"/>
-    <p:sldId id="274" r:id="rId14"/>
-    <p:sldId id="269" r:id="rId15"/>
+    <p:sldId id="276" r:id="rId5"/>
+    <p:sldId id="279" r:id="rId6"/>
+    <p:sldId id="277" r:id="rId7"/>
+    <p:sldId id="268" r:id="rId8"/>
+    <p:sldId id="267" r:id="rId9"/>
+    <p:sldId id="270" r:id="rId10"/>
+    <p:sldId id="271" r:id="rId11"/>
+    <p:sldId id="274" r:id="rId12"/>
+    <p:sldId id="269" r:id="rId13"/>
   </p:sldIdLst>
   <p:sldSz cx="9144000" cy="6858000" type="screen4x3"/>
   <p:notesSz cx="6858000" cy="9144000"/>
   <p:embeddedFontLst>
     <p:embeddedFont>
+      <p:font typeface="-윤고딕310" panose="02030504000101010101" pitchFamily="18" charset="-127"/>
+      <p:regular r:id="rId16"/>
+    </p:embeddedFont>
+    <p:embeddedFont>
+      <p:font typeface="맑은 고딕" panose="020B0503020000020004" pitchFamily="50" charset="-127"/>
+      <p:regular r:id="rId17"/>
+      <p:bold r:id="rId18"/>
+    </p:embeddedFont>
+    <p:embeddedFont>
+      <p:font typeface="-윤고딕320" panose="02030504000101010101" pitchFamily="18" charset="-127"/>
+      <p:regular r:id="rId19"/>
+    </p:embeddedFont>
+    <p:embeddedFont>
+      <p:font typeface="Franklin Gothic Book" panose="020B0503020102020204" pitchFamily="34" charset="0"/>
+      <p:regular r:id="rId20"/>
+      <p:italic r:id="rId21"/>
+    </p:embeddedFont>
+    <p:embeddedFont>
+      <p:font typeface="HY신명조" panose="02030600000101010101" pitchFamily="18" charset="-127"/>
+      <p:regular r:id="rId22"/>
+    </p:embeddedFont>
+    <p:embeddedFont>
       <p:font typeface="Rage Italic" panose="03070502040507070304" pitchFamily="66" charset="0"/>
-      <p:regular r:id="rId18"/>
+      <p:regular r:id="rId23"/>
     </p:embeddedFont>
     <p:embeddedFont>
       <p:font typeface="Constantia" panose="02030602050306030303" pitchFamily="18" charset="0"/>
-      <p:regular r:id="rId19"/>
-      <p:bold r:id="rId20"/>
-      <p:italic r:id="rId21"/>
-      <p:boldItalic r:id="rId22"/>
+      <p:regular r:id="rId24"/>
+      <p:bold r:id="rId25"/>
+      <p:italic r:id="rId26"/>
+      <p:boldItalic r:id="rId27"/>
     </p:embeddedFont>
     <p:embeddedFont>
       <p:font typeface="-윤고딕330" panose="02030504000101010101" pitchFamily="18" charset="-127"/>
-      <p:regular r:id="rId23"/>
+      <p:regular r:id="rId28"/>
     </p:embeddedFont>
     <p:embeddedFont>
       <p:font typeface="Brush Script MT" panose="03060802040406070304" pitchFamily="66" charset="0"/>
-      <p:italic r:id="rId24"/>
-    </p:embeddedFont>
-    <p:embeddedFont>
-      <p:font typeface="맑은 고딕" panose="020B0503020000020004" pitchFamily="50" charset="-127"/>
-      <p:regular r:id="rId25"/>
-      <p:bold r:id="rId26"/>
-    </p:embeddedFont>
-    <p:embeddedFont>
-      <p:font typeface="Franklin Gothic Book" panose="020B0503020102020204" pitchFamily="34" charset="0"/>
-      <p:regular r:id="rId27"/>
-      <p:italic r:id="rId28"/>
-    </p:embeddedFont>
-    <p:embeddedFont>
-      <p:font typeface="HY신명조" panose="02030600000101010101" pitchFamily="18" charset="-127"/>
-      <p:regular r:id="rId29"/>
-    </p:embeddedFont>
-    <p:embeddedFont>
-      <p:font typeface="-윤고딕310" panose="02030504000101010101" pitchFamily="18" charset="-127"/>
-      <p:regular r:id="rId30"/>
-    </p:embeddedFont>
-    <p:embeddedFont>
-      <p:font typeface="-윤고딕320" panose="02030504000101010101" pitchFamily="18" charset="-127"/>
-      <p:regular r:id="rId31"/>
+      <p:italic r:id="rId29"/>
     </p:embeddedFont>
   </p:embeddedFontLst>
   <p:defaultTextStyle>
@@ -2937,7 +2935,7 @@
           <a:p>
             <a:fld id="{8F1DCB68-D71C-4438-9E18-1A39E8F98C0B}" type="datetime1">
               <a:rPr lang="ko-KR" altLang="en-US" smtClean="0"/>
-              <a:t>2017-10-23</a:t>
+              <a:t>2017-10-27</a:t>
             </a:fld>
             <a:endParaRPr lang="ko-KR" altLang="en-US"/>
           </a:p>
@@ -3103,7 +3101,7 @@
           <a:p>
             <a:fld id="{63FC2A86-C442-46A0-A683-343668E3757C}" type="datetime1">
               <a:rPr lang="ko-KR" altLang="en-US" smtClean="0"/>
-              <a:t>2017-10-23</a:t>
+              <a:t>2017-10-27</a:t>
             </a:fld>
             <a:endParaRPr lang="ko-KR" altLang="en-US"/>
           </a:p>
@@ -4083,7 +4081,7 @@
           <a:p>
             <a:fld id="{C4C21969-2D44-4836-8054-FEC5EC083A94}" type="datetime1">
               <a:rPr lang="ko-KR" altLang="en-US" smtClean="0"/>
-              <a:t>2017-10-23</a:t>
+              <a:t>2017-10-27</a:t>
             </a:fld>
             <a:endParaRPr lang="ko-KR" altLang="en-US"/>
           </a:p>
@@ -4270,7 +4268,7 @@
           <a:p>
             <a:fld id="{32EDA418-6416-4039-85B1-BA4CF1FD94DE}" type="datetime1">
               <a:rPr lang="ko-KR" altLang="en-US" smtClean="0"/>
-              <a:t>2017-10-23</a:t>
+              <a:t>2017-10-27</a:t>
             </a:fld>
             <a:endParaRPr lang="ko-KR" altLang="en-US"/>
           </a:p>
@@ -4457,7 +4455,7 @@
           <a:p>
             <a:fld id="{879D85B1-5D19-4B8C-B403-10E52B96C9A2}" type="datetime1">
               <a:rPr lang="ko-KR" altLang="en-US" smtClean="0"/>
-              <a:t>2017-10-23</a:t>
+              <a:t>2017-10-27</a:t>
             </a:fld>
             <a:endParaRPr lang="ko-KR" altLang="en-US"/>
           </a:p>
@@ -4630,7 +4628,7 @@
           <a:p>
             <a:fld id="{8998F1EC-F01B-4CCC-A0E8-CD7012E5E6C0}" type="datetime1">
               <a:rPr lang="ko-KR" altLang="en-US" smtClean="0"/>
-              <a:t>2017-10-23</a:t>
+              <a:t>2017-10-27</a:t>
             </a:fld>
             <a:endParaRPr lang="ko-KR" altLang="en-US"/>
           </a:p>
@@ -4877,7 +4875,7 @@
           <a:p>
             <a:fld id="{52787909-DE3C-4D58-A58F-9F026A606388}" type="datetime1">
               <a:rPr lang="ko-KR" altLang="en-US" smtClean="0"/>
-              <a:t>2017-10-23</a:t>
+              <a:t>2017-10-27</a:t>
             </a:fld>
             <a:endParaRPr lang="ko-KR" altLang="en-US"/>
           </a:p>
@@ -4998,7 +4996,7 @@
           <a:p>
             <a:fld id="{7666CBAD-7B00-470A-90AD-5135048686B9}" type="datetime1">
               <a:rPr lang="ko-KR" altLang="en-US" smtClean="0"/>
-              <a:t>2017-10-23</a:t>
+              <a:t>2017-10-27</a:t>
             </a:fld>
             <a:endParaRPr lang="ko-KR" altLang="en-US"/>
           </a:p>
@@ -5379,7 +5377,7 @@
           <a:p>
             <a:fld id="{0CF463A9-D5DB-4824-87E2-C1D0AC51B4AF}" type="datetime1">
               <a:rPr lang="ko-KR" altLang="en-US" smtClean="0"/>
-              <a:t>2017-10-23</a:t>
+              <a:t>2017-10-27</a:t>
             </a:fld>
             <a:endParaRPr lang="ko-KR" altLang="en-US"/>
           </a:p>
@@ -5614,7 +5612,7 @@
           <a:p>
             <a:fld id="{C70BB2E4-12BC-438F-94A6-F50FE8A3D88C}" type="datetime1">
               <a:rPr lang="ko-KR" altLang="en-US" smtClean="0"/>
-              <a:t>2017-10-23</a:t>
+              <a:t>2017-10-27</a:t>
             </a:fld>
             <a:endParaRPr lang="ko-KR" altLang="en-US"/>
           </a:p>
@@ -5712,7 +5710,7 @@
           <a:p>
             <a:fld id="{9544425C-B7EA-494A-BDEE-4AA66243A9BD}" type="datetime1">
               <a:rPr lang="ko-KR" altLang="en-US" smtClean="0"/>
-              <a:t>2017-10-23</a:t>
+              <a:t>2017-10-27</a:t>
             </a:fld>
             <a:endParaRPr lang="ko-KR" altLang="en-US"/>
           </a:p>
@@ -6547,7 +6545,7 @@
           <a:p>
             <a:fld id="{EC5C1134-AEED-45C1-AFDF-DDF26E0C6587}" type="datetime1">
               <a:rPr lang="ko-KR" altLang="en-US" smtClean="0"/>
-              <a:t>2017-10-23</a:t>
+              <a:t>2017-10-27</a:t>
             </a:fld>
             <a:endParaRPr lang="ko-KR" altLang="en-US"/>
           </a:p>
@@ -7386,7 +7384,7 @@
           <a:p>
             <a:fld id="{971A1825-C447-468B-B9C9-6B7674910854}" type="datetime1">
               <a:rPr lang="ko-KR" altLang="en-US" smtClean="0"/>
-              <a:t>2017-10-23</a:t>
+              <a:t>2017-10-27</a:t>
             </a:fld>
             <a:endParaRPr lang="ko-KR" altLang="en-US"/>
           </a:p>
@@ -8048,7 +8046,7 @@
           <a:p>
             <a:fld id="{4E0EA9FF-3011-4849-B3DE-625476BF3408}" type="datetime1">
               <a:rPr lang="ko-KR" altLang="en-US" smtClean="0"/>
-              <a:t>2017-10-23</a:t>
+              <a:t>2017-10-27</a:t>
             </a:fld>
             <a:endParaRPr lang="ko-KR" altLang="en-US"/>
           </a:p>
@@ -8765,1201 +8763,6 @@
                 <a:latin typeface="-윤고딕320" panose="02030504000101010101" pitchFamily="18" charset="-127"/>
                 <a:ea typeface="-윤고딕320" panose="02030504000101010101" pitchFamily="18" charset="-127"/>
               </a:rPr>
-              <a:t>(1)</a:t>
-            </a:r>
-            <a:endParaRPr lang="ko-KR" altLang="en-US" dirty="0">
-              <a:latin typeface="-윤고딕320" panose="02030504000101010101" pitchFamily="18" charset="-127"/>
-              <a:ea typeface="-윤고딕320" panose="02030504000101010101" pitchFamily="18" charset="-127"/>
-            </a:endParaRPr>
-          </a:p>
-        </p:txBody>
-      </p:sp>
-      <p:graphicFrame>
-        <p:nvGraphicFramePr>
-          <p:cNvPr id="7" name="내용 개체 틀 6"/>
-          <p:cNvGraphicFramePr>
-            <a:graphicFrameLocks noGrp="1"/>
-          </p:cNvGraphicFramePr>
-          <p:nvPr>
-            <p:ph idx="1"/>
-            <p:extLst>
-              <p:ext uri="{D42A27DB-BD31-4B8C-83A1-F6EECF244321}">
-                <p14:modId xmlns:p14="http://schemas.microsoft.com/office/powerpoint/2010/main" val="1302906887"/>
-              </p:ext>
-            </p:extLst>
-          </p:nvPr>
-        </p:nvGraphicFramePr>
-        <p:xfrm>
-          <a:off x="827584" y="1844818"/>
-          <a:ext cx="7488832" cy="4008675"/>
-        </p:xfrm>
-        <a:graphic>
-          <a:graphicData uri="http://schemas.openxmlformats.org/drawingml/2006/table">
-            <a:tbl>
-              <a:tblPr firstRow="1" bandRow="1">
-                <a:effectLst>
-                  <a:innerShdw blurRad="228600">
-                    <a:prstClr val="black">
-                      <a:alpha val="98000"/>
-                    </a:prstClr>
-                  </a:innerShdw>
-                </a:effectLst>
-                <a:tableStyleId>{5C22544A-7EE6-4342-B048-85BDC9FD1C3A}</a:tableStyleId>
-              </a:tblPr>
-              <a:tblGrid>
-                <a:gridCol w="706347"/>
-                <a:gridCol w="1695233"/>
-                <a:gridCol w="5087252"/>
-              </a:tblGrid>
-              <a:tr h="442817">
-                <a:tc>
-                  <a:txBody>
-                    <a:bodyPr/>
-                    <a:lstStyle/>
-                    <a:p>
-                      <a:pPr algn="ctr" latinLnBrk="1"/>
-                      <a:r>
-                        <a:rPr lang="ko-KR" altLang="en-US" sz="2000" b="0" dirty="0" smtClean="0">
-                          <a:latin typeface="-윤고딕320" panose="02030504000101010101" pitchFamily="18" charset="-127"/>
-                          <a:ea typeface="-윤고딕320" panose="02030504000101010101" pitchFamily="18" charset="-127"/>
-                        </a:rPr>
-                        <a:t>주차</a:t>
-                      </a:r>
-                      <a:endParaRPr lang="ko-KR" altLang="en-US" sz="2000" b="0" dirty="0">
-                        <a:latin typeface="-윤고딕320" panose="02030504000101010101" pitchFamily="18" charset="-127"/>
-                        <a:ea typeface="-윤고딕320" panose="02030504000101010101" pitchFamily="18" charset="-127"/>
-                      </a:endParaRPr>
-                    </a:p>
-                  </a:txBody>
-                  <a:tcPr marL="111605" marR="111605" marT="55802" marB="55802" anchor="ctr">
-                    <a:solidFill>
-                      <a:schemeClr val="accent1">
-                        <a:tint val="40000"/>
-                        <a:alpha val="35000"/>
-                      </a:schemeClr>
-                    </a:solidFill>
-                  </a:tcPr>
-                </a:tc>
-                <a:tc>
-                  <a:txBody>
-                    <a:bodyPr/>
-                    <a:lstStyle/>
-                    <a:p>
-                      <a:pPr algn="ctr" latinLnBrk="1"/>
-                      <a:r>
-                        <a:rPr lang="ko-KR" altLang="en-US" sz="2000" b="0" dirty="0" smtClean="0">
-                          <a:latin typeface="-윤고딕320" panose="02030504000101010101" pitchFamily="18" charset="-127"/>
-                          <a:ea typeface="-윤고딕320" panose="02030504000101010101" pitchFamily="18" charset="-127"/>
-                        </a:rPr>
-                        <a:t>주제</a:t>
-                      </a:r>
-                      <a:endParaRPr lang="ko-KR" altLang="en-US" sz="2000" b="0" dirty="0">
-                        <a:latin typeface="-윤고딕320" panose="02030504000101010101" pitchFamily="18" charset="-127"/>
-                        <a:ea typeface="-윤고딕320" panose="02030504000101010101" pitchFamily="18" charset="-127"/>
-                      </a:endParaRPr>
-                    </a:p>
-                  </a:txBody>
-                  <a:tcPr marL="111605" marR="111605" marT="55802" marB="55802" anchor="ctr"/>
-                </a:tc>
-                <a:tc>
-                  <a:txBody>
-                    <a:bodyPr/>
-                    <a:lstStyle/>
-                    <a:p>
-                      <a:pPr algn="ctr" latinLnBrk="1"/>
-                      <a:r>
-                        <a:rPr lang="ko-KR" altLang="en-US" sz="2000" b="0" dirty="0" smtClean="0">
-                          <a:latin typeface="-윤고딕320" panose="02030504000101010101" pitchFamily="18" charset="-127"/>
-                          <a:ea typeface="-윤고딕320" panose="02030504000101010101" pitchFamily="18" charset="-127"/>
-                        </a:rPr>
-                        <a:t>상세</a:t>
-                      </a:r>
-                      <a:endParaRPr lang="ko-KR" altLang="en-US" sz="2000" b="0" dirty="0">
-                        <a:latin typeface="-윤고딕320" panose="02030504000101010101" pitchFamily="18" charset="-127"/>
-                        <a:ea typeface="-윤고딕320" panose="02030504000101010101" pitchFamily="18" charset="-127"/>
-                      </a:endParaRPr>
-                    </a:p>
-                  </a:txBody>
-                  <a:tcPr marL="111605" marR="111605" marT="55802" marB="55802" anchor="ctr"/>
-                </a:tc>
-              </a:tr>
-              <a:tr h="1165274">
-                <a:tc>
-                  <a:txBody>
-                    <a:bodyPr/>
-                    <a:lstStyle/>
-                    <a:p>
-                      <a:pPr algn="ctr" latinLnBrk="1"/>
-                      <a:r>
-                        <a:rPr lang="en-US" altLang="ko-KR" sz="1900" dirty="0" smtClean="0">
-                          <a:latin typeface="-윤고딕310" panose="02030504000101010101" pitchFamily="18" charset="-127"/>
-                          <a:ea typeface="-윤고딕310" panose="02030504000101010101" pitchFamily="18" charset="-127"/>
-                        </a:rPr>
-                        <a:t>1</a:t>
-                      </a:r>
-                      <a:endParaRPr lang="ko-KR" altLang="en-US" sz="1900" dirty="0">
-                        <a:latin typeface="-윤고딕310" panose="02030504000101010101" pitchFamily="18" charset="-127"/>
-                        <a:ea typeface="-윤고딕310" panose="02030504000101010101" pitchFamily="18" charset="-127"/>
-                      </a:endParaRPr>
-                    </a:p>
-                  </a:txBody>
-                  <a:tcPr marL="111605" marR="111605" marT="55802" marB="55802" anchor="ctr">
-                    <a:solidFill>
-                      <a:schemeClr val="accent1">
-                        <a:tint val="40000"/>
-                        <a:alpha val="35000"/>
-                      </a:schemeClr>
-                    </a:solidFill>
-                  </a:tcPr>
-                </a:tc>
-                <a:tc>
-                  <a:txBody>
-                    <a:bodyPr/>
-                    <a:lstStyle/>
-                    <a:p>
-                      <a:pPr marL="0" indent="0" algn="ctr" latinLnBrk="1">
-                        <a:buFont typeface="Arial" panose="020B0604020202020204" pitchFamily="34" charset="0"/>
-                        <a:buNone/>
-                      </a:pPr>
-                      <a:r>
-                        <a:rPr lang="ko-KR" altLang="en-US" sz="1200" dirty="0" smtClean="0">
-                          <a:latin typeface="-윤고딕310" panose="02030504000101010101" pitchFamily="18" charset="-127"/>
-                          <a:ea typeface="-윤고딕310" panose="02030504000101010101" pitchFamily="18" charset="-127"/>
-                        </a:rPr>
-                        <a:t>기본적 메커니즘</a:t>
-                      </a:r>
-                      <a:endParaRPr lang="en-US" altLang="ko-KR" sz="1200" dirty="0" smtClean="0">
-                        <a:latin typeface="-윤고딕310" panose="02030504000101010101" pitchFamily="18" charset="-127"/>
-                        <a:ea typeface="-윤고딕310" panose="02030504000101010101" pitchFamily="18" charset="-127"/>
-                      </a:endParaRPr>
-                    </a:p>
-                    <a:p>
-                      <a:pPr marL="0" indent="0" algn="ctr" latinLnBrk="1">
-                        <a:buFont typeface="Arial" panose="020B0604020202020204" pitchFamily="34" charset="0"/>
-                        <a:buNone/>
-                      </a:pPr>
-                      <a:r>
-                        <a:rPr lang="ko-KR" altLang="en-US" sz="1200" dirty="0" smtClean="0">
-                          <a:latin typeface="-윤고딕310" panose="02030504000101010101" pitchFamily="18" charset="-127"/>
-                          <a:ea typeface="-윤고딕310" panose="02030504000101010101" pitchFamily="18" charset="-127"/>
-                        </a:rPr>
-                        <a:t>지형과 중력</a:t>
-                      </a:r>
-                      <a:endParaRPr lang="ko-KR" altLang="en-US" sz="1200" dirty="0">
-                        <a:latin typeface="-윤고딕310" panose="02030504000101010101" pitchFamily="18" charset="-127"/>
-                        <a:ea typeface="-윤고딕310" panose="02030504000101010101" pitchFamily="18" charset="-127"/>
-                      </a:endParaRPr>
-                    </a:p>
-                  </a:txBody>
-                  <a:tcPr marL="111605" marR="111605" marT="55802" marB="55802" anchor="ctr"/>
-                </a:tc>
-                <a:tc>
-                  <a:txBody>
-                    <a:bodyPr/>
-                    <a:lstStyle/>
-                    <a:p>
-                      <a:pPr marL="171450" indent="-171450" latinLnBrk="1">
-                        <a:buFont typeface="Arial" panose="020B0604020202020204" pitchFamily="34" charset="0"/>
-                        <a:buChar char="•"/>
-                      </a:pPr>
-                      <a:r>
-                        <a:rPr lang="ko-KR" altLang="en-US" sz="1200" dirty="0" smtClean="0">
-                          <a:latin typeface="-윤고딕310" panose="02030504000101010101" pitchFamily="18" charset="-127"/>
-                          <a:ea typeface="-윤고딕310" panose="02030504000101010101" pitchFamily="18" charset="-127"/>
-                        </a:rPr>
-                        <a:t>필요한 객체를 모두 정의하고 상속 관계를 분명히 한다</a:t>
-                      </a:r>
-                      <a:r>
-                        <a:rPr lang="en-US" altLang="ko-KR" sz="1200" dirty="0" smtClean="0">
-                          <a:latin typeface="-윤고딕310" panose="02030504000101010101" pitchFamily="18" charset="-127"/>
-                          <a:ea typeface="-윤고딕310" panose="02030504000101010101" pitchFamily="18" charset="-127"/>
-                        </a:rPr>
-                        <a:t>.  </a:t>
-                      </a:r>
-                      <a:r>
-                        <a:rPr lang="ko-KR" altLang="en-US" sz="1200" dirty="0" smtClean="0">
-                          <a:latin typeface="-윤고딕310" panose="02030504000101010101" pitchFamily="18" charset="-127"/>
-                          <a:ea typeface="-윤고딕310" panose="02030504000101010101" pitchFamily="18" charset="-127"/>
-                        </a:rPr>
-                        <a:t>모든 객체들은 하나의 중력 객체를 상속한다</a:t>
-                      </a:r>
-                      <a:r>
-                        <a:rPr lang="en-US" altLang="ko-KR" sz="1200" dirty="0" smtClean="0">
-                          <a:latin typeface="-윤고딕310" panose="02030504000101010101" pitchFamily="18" charset="-127"/>
-                          <a:ea typeface="-윤고딕310" panose="02030504000101010101" pitchFamily="18" charset="-127"/>
-                        </a:rPr>
-                        <a:t>.</a:t>
-                      </a:r>
-                      <a:r>
-                        <a:rPr lang="en-US" altLang="ko-KR" sz="1200" baseline="0" dirty="0" smtClean="0">
-                          <a:latin typeface="-윤고딕310" panose="02030504000101010101" pitchFamily="18" charset="-127"/>
-                          <a:ea typeface="-윤고딕310" panose="02030504000101010101" pitchFamily="18" charset="-127"/>
-                        </a:rPr>
-                        <a:t> </a:t>
-                      </a:r>
-                      <a:r>
-                        <a:rPr lang="ko-KR" altLang="en-US" sz="1200" baseline="0" dirty="0" smtClean="0">
-                          <a:latin typeface="-윤고딕310" panose="02030504000101010101" pitchFamily="18" charset="-127"/>
-                          <a:ea typeface="-윤고딕310" panose="02030504000101010101" pitchFamily="18" charset="-127"/>
-                        </a:rPr>
-                        <a:t>메소드들 역시 규격화된 이름으로 정리한다</a:t>
-                      </a:r>
-                      <a:r>
-                        <a:rPr lang="en-US" altLang="ko-KR" sz="1200" baseline="0" dirty="0" smtClean="0">
-                          <a:latin typeface="-윤고딕310" panose="02030504000101010101" pitchFamily="18" charset="-127"/>
-                          <a:ea typeface="-윤고딕310" panose="02030504000101010101" pitchFamily="18" charset="-127"/>
-                        </a:rPr>
-                        <a:t>.</a:t>
-                      </a:r>
-                    </a:p>
-                    <a:p>
-                      <a:pPr marL="171450" marR="0" indent="-171450" algn="l" defTabSz="914400" rtl="0" eaLnBrk="1" fontAlgn="auto" latinLnBrk="1" hangingPunct="1">
-                        <a:lnSpc>
-                          <a:spcPct val="100000"/>
-                        </a:lnSpc>
-                        <a:spcBef>
-                          <a:spcPts val="0"/>
-                        </a:spcBef>
-                        <a:spcAft>
-                          <a:spcPts val="0"/>
-                        </a:spcAft>
-                        <a:buClrTx/>
-                        <a:buSzTx/>
-                        <a:buFont typeface="Arial" panose="020B0604020202020204" pitchFamily="34" charset="0"/>
-                        <a:buChar char="•"/>
-                        <a:tabLst/>
-                        <a:defRPr/>
-                      </a:pPr>
-                      <a:r>
-                        <a:rPr lang="ko-KR" altLang="en-US" sz="1200" dirty="0" smtClean="0">
-                          <a:latin typeface="-윤고딕310" panose="02030504000101010101" pitchFamily="18" charset="-127"/>
-                          <a:ea typeface="-윤고딕310" panose="02030504000101010101" pitchFamily="18" charset="-127"/>
-                        </a:rPr>
-                        <a:t>지형 객체의 특수화를 한다</a:t>
-                      </a:r>
-                      <a:r>
-                        <a:rPr lang="en-US" altLang="ko-KR" sz="1200" dirty="0" smtClean="0">
-                          <a:latin typeface="-윤고딕310" panose="02030504000101010101" pitchFamily="18" charset="-127"/>
-                          <a:ea typeface="-윤고딕310" panose="02030504000101010101" pitchFamily="18" charset="-127"/>
-                        </a:rPr>
-                        <a:t>.</a:t>
-                      </a:r>
-                      <a:r>
-                        <a:rPr lang="ko-KR" altLang="en-US" sz="1200" dirty="0" smtClean="0">
-                          <a:latin typeface="-윤고딕310" panose="02030504000101010101" pitchFamily="18" charset="-127"/>
-                          <a:ea typeface="-윤고딕310" panose="02030504000101010101" pitchFamily="18" charset="-127"/>
-                        </a:rPr>
-                        <a:t> 중력 객체</a:t>
-                      </a:r>
-                      <a:r>
-                        <a:rPr lang="en-US" altLang="ko-KR" sz="1200" dirty="0" smtClean="0">
-                          <a:latin typeface="-윤고딕310" panose="02030504000101010101" pitchFamily="18" charset="-127"/>
-                          <a:ea typeface="-윤고딕310" panose="02030504000101010101" pitchFamily="18" charset="-127"/>
-                        </a:rPr>
-                        <a:t>-&gt;</a:t>
-                      </a:r>
-                      <a:r>
-                        <a:rPr lang="ko-KR" altLang="en-US" sz="1200" dirty="0" smtClean="0">
-                          <a:latin typeface="-윤고딕310" panose="02030504000101010101" pitchFamily="18" charset="-127"/>
-                          <a:ea typeface="-윤고딕310" panose="02030504000101010101" pitchFamily="18" charset="-127"/>
-                        </a:rPr>
-                        <a:t>블록</a:t>
-                      </a:r>
-                      <a:r>
-                        <a:rPr lang="en-US" altLang="ko-KR" sz="1200" dirty="0" smtClean="0">
-                          <a:latin typeface="-윤고딕310" panose="02030504000101010101" pitchFamily="18" charset="-127"/>
-                          <a:ea typeface="-윤고딕310" panose="02030504000101010101" pitchFamily="18" charset="-127"/>
-                        </a:rPr>
-                        <a:t>-&gt;</a:t>
-                      </a:r>
-                      <a:r>
-                        <a:rPr lang="ko-KR" altLang="en-US" sz="1200" dirty="0" smtClean="0">
-                          <a:latin typeface="-윤고딕310" panose="02030504000101010101" pitchFamily="18" charset="-127"/>
-                          <a:ea typeface="-윤고딕310" panose="02030504000101010101" pitchFamily="18" charset="-127"/>
-                        </a:rPr>
-                        <a:t>나무</a:t>
-                      </a:r>
-                      <a:r>
-                        <a:rPr lang="en-US" altLang="ko-KR" sz="1200" dirty="0" smtClean="0">
-                          <a:latin typeface="-윤고딕310" panose="02030504000101010101" pitchFamily="18" charset="-127"/>
-                          <a:ea typeface="-윤고딕310" panose="02030504000101010101" pitchFamily="18" charset="-127"/>
-                        </a:rPr>
-                        <a:t>, </a:t>
-                      </a:r>
-                      <a:r>
-                        <a:rPr lang="ko-KR" altLang="en-US" sz="1200" dirty="0" smtClean="0">
-                          <a:latin typeface="-윤고딕310" panose="02030504000101010101" pitchFamily="18" charset="-127"/>
-                          <a:ea typeface="-윤고딕310" panose="02030504000101010101" pitchFamily="18" charset="-127"/>
-                        </a:rPr>
-                        <a:t>벽돌</a:t>
-                      </a:r>
-                      <a:r>
-                        <a:rPr lang="en-US" altLang="ko-KR" sz="1200" dirty="0" smtClean="0">
-                          <a:latin typeface="-윤고딕310" panose="02030504000101010101" pitchFamily="18" charset="-127"/>
-                          <a:ea typeface="-윤고딕310" panose="02030504000101010101" pitchFamily="18" charset="-127"/>
-                        </a:rPr>
-                        <a:t>, </a:t>
-                      </a:r>
-                      <a:r>
-                        <a:rPr lang="ko-KR" altLang="en-US" sz="1200" dirty="0" smtClean="0">
-                          <a:latin typeface="-윤고딕310" panose="02030504000101010101" pitchFamily="18" charset="-127"/>
-                          <a:ea typeface="-윤고딕310" panose="02030504000101010101" pitchFamily="18" charset="-127"/>
-                        </a:rPr>
-                        <a:t>땅</a:t>
-                      </a:r>
-                      <a:r>
-                        <a:rPr lang="en-US" altLang="ko-KR" sz="1200" dirty="0" smtClean="0">
-                          <a:latin typeface="-윤고딕310" panose="02030504000101010101" pitchFamily="18" charset="-127"/>
-                          <a:ea typeface="-윤고딕310" panose="02030504000101010101" pitchFamily="18" charset="-127"/>
-                        </a:rPr>
-                        <a:t>, …</a:t>
-                      </a:r>
-                    </a:p>
-                    <a:p>
-                      <a:pPr marL="171450" marR="0" indent="-171450" algn="l" defTabSz="914400" rtl="0" eaLnBrk="1" fontAlgn="auto" latinLnBrk="1" hangingPunct="1">
-                        <a:lnSpc>
-                          <a:spcPct val="100000"/>
-                        </a:lnSpc>
-                        <a:spcBef>
-                          <a:spcPts val="0"/>
-                        </a:spcBef>
-                        <a:spcAft>
-                          <a:spcPts val="0"/>
-                        </a:spcAft>
-                        <a:buClrTx/>
-                        <a:buSzTx/>
-                        <a:buFont typeface="Arial" panose="020B0604020202020204" pitchFamily="34" charset="0"/>
-                        <a:buChar char="•"/>
-                        <a:tabLst/>
-                        <a:defRPr/>
-                      </a:pPr>
-                      <a:r>
-                        <a:rPr lang="ko-KR" altLang="en-US" sz="1200" dirty="0" smtClean="0">
-                          <a:latin typeface="-윤고딕310" panose="02030504000101010101" pitchFamily="18" charset="-127"/>
-                          <a:ea typeface="-윤고딕310" panose="02030504000101010101" pitchFamily="18" charset="-127"/>
-                        </a:rPr>
-                        <a:t>모든 개체는 중력이 작동한다</a:t>
-                      </a:r>
-                      <a:r>
-                        <a:rPr lang="en-US" altLang="ko-KR" sz="1200" dirty="0" smtClean="0">
-                          <a:latin typeface="-윤고딕310" panose="02030504000101010101" pitchFamily="18" charset="-127"/>
-                          <a:ea typeface="-윤고딕310" panose="02030504000101010101" pitchFamily="18" charset="-127"/>
-                        </a:rPr>
-                        <a:t>. </a:t>
-                      </a:r>
-                      <a:r>
-                        <a:rPr lang="ko-KR" altLang="en-US" sz="1200" dirty="0" smtClean="0">
-                          <a:latin typeface="-윤고딕310" panose="02030504000101010101" pitchFamily="18" charset="-127"/>
-                          <a:ea typeface="-윤고딕310" panose="02030504000101010101" pitchFamily="18" charset="-127"/>
-                        </a:rPr>
-                        <a:t>충돌 처리를 위해 개체 리스트가 들어있는 이름으로 구분된 사전에서 반복문을 돌려서 처리한다</a:t>
-                      </a:r>
-                      <a:endParaRPr lang="ko-KR" altLang="en-US" sz="1200" dirty="0">
-                        <a:latin typeface="-윤고딕310" panose="02030504000101010101" pitchFamily="18" charset="-127"/>
-                        <a:ea typeface="-윤고딕310" panose="02030504000101010101" pitchFamily="18" charset="-127"/>
-                      </a:endParaRPr>
-                    </a:p>
-                  </a:txBody>
-                  <a:tcPr marL="111605" marR="111605" marT="55802" marB="55802"/>
-                </a:tc>
-              </a:tr>
-              <a:tr h="702124">
-                <a:tc>
-                  <a:txBody>
-                    <a:bodyPr/>
-                    <a:lstStyle/>
-                    <a:p>
-                      <a:pPr algn="ctr" latinLnBrk="1"/>
-                      <a:r>
-                        <a:rPr lang="en-US" altLang="ko-KR" sz="1900" dirty="0" smtClean="0">
-                          <a:latin typeface="-윤고딕310" panose="02030504000101010101" pitchFamily="18" charset="-127"/>
-                          <a:ea typeface="-윤고딕310" panose="02030504000101010101" pitchFamily="18" charset="-127"/>
-                        </a:rPr>
-                        <a:t>2</a:t>
-                      </a:r>
-                      <a:endParaRPr lang="ko-KR" altLang="en-US" sz="1900" dirty="0">
-                        <a:latin typeface="-윤고딕310" panose="02030504000101010101" pitchFamily="18" charset="-127"/>
-                        <a:ea typeface="-윤고딕310" panose="02030504000101010101" pitchFamily="18" charset="-127"/>
-                      </a:endParaRPr>
-                    </a:p>
-                  </a:txBody>
-                  <a:tcPr marL="111605" marR="111605" marT="55802" marB="55802" anchor="ctr">
-                    <a:solidFill>
-                      <a:schemeClr val="accent1">
-                        <a:tint val="40000"/>
-                        <a:alpha val="35000"/>
-                      </a:schemeClr>
-                    </a:solidFill>
-                  </a:tcPr>
-                </a:tc>
-                <a:tc>
-                  <a:txBody>
-                    <a:bodyPr/>
-                    <a:lstStyle/>
-                    <a:p>
-                      <a:pPr marL="0" indent="0" algn="ctr" latinLnBrk="1">
-                        <a:buFont typeface="Arial" panose="020B0604020202020204" pitchFamily="34" charset="0"/>
-                        <a:buNone/>
-                      </a:pPr>
-                      <a:r>
-                        <a:rPr lang="ko-KR" altLang="en-US" sz="1200" dirty="0" smtClean="0">
-                          <a:latin typeface="-윤고딕310" panose="02030504000101010101" pitchFamily="18" charset="-127"/>
-                          <a:ea typeface="-윤고딕310" panose="02030504000101010101" pitchFamily="18" charset="-127"/>
-                        </a:rPr>
-                        <a:t>리소스 수집과 테스트</a:t>
-                      </a:r>
-                      <a:endParaRPr lang="ko-KR" altLang="en-US" sz="1200" dirty="0">
-                        <a:latin typeface="-윤고딕310" panose="02030504000101010101" pitchFamily="18" charset="-127"/>
-                        <a:ea typeface="-윤고딕310" panose="02030504000101010101" pitchFamily="18" charset="-127"/>
-                      </a:endParaRPr>
-                    </a:p>
-                  </a:txBody>
-                  <a:tcPr marL="111605" marR="111605" marT="55802" marB="55802" anchor="ctr"/>
-                </a:tc>
-                <a:tc>
-                  <a:txBody>
-                    <a:bodyPr/>
-                    <a:lstStyle/>
-                    <a:p>
-                      <a:pPr marL="171450" marR="0" indent="-171450" algn="l" defTabSz="914400" rtl="0" eaLnBrk="1" fontAlgn="auto" latinLnBrk="1" hangingPunct="1">
-                        <a:lnSpc>
-                          <a:spcPct val="100000"/>
-                        </a:lnSpc>
-                        <a:spcBef>
-                          <a:spcPts val="0"/>
-                        </a:spcBef>
-                        <a:spcAft>
-                          <a:spcPts val="0"/>
-                        </a:spcAft>
-                        <a:buClrTx/>
-                        <a:buSzTx/>
-                        <a:buFont typeface="Arial" panose="020B0604020202020204" pitchFamily="34" charset="0"/>
-                        <a:buChar char="•"/>
-                        <a:tabLst/>
-                        <a:defRPr/>
-                      </a:pPr>
-                      <a:r>
-                        <a:rPr lang="ko-KR" altLang="en-US" sz="1200" dirty="0" smtClean="0">
-                          <a:latin typeface="-윤고딕310" panose="02030504000101010101" pitchFamily="18" charset="-127"/>
-                          <a:ea typeface="-윤고딕310" panose="02030504000101010101" pitchFamily="18" charset="-127"/>
-                        </a:rPr>
-                        <a:t>필요한 리소스를 구하고 객체들에 적용한다</a:t>
-                      </a:r>
-                      <a:r>
-                        <a:rPr lang="en-US" altLang="ko-KR" sz="1200" dirty="0" smtClean="0">
-                          <a:latin typeface="-윤고딕310" panose="02030504000101010101" pitchFamily="18" charset="-127"/>
-                          <a:ea typeface="-윤고딕310" panose="02030504000101010101" pitchFamily="18" charset="-127"/>
-                        </a:rPr>
-                        <a:t>. </a:t>
-                      </a:r>
-                      <a:r>
-                        <a:rPr lang="ko-KR" altLang="en-US" sz="1200" dirty="0" smtClean="0">
-                          <a:latin typeface="-윤고딕310" panose="02030504000101010101" pitchFamily="18" charset="-127"/>
-                          <a:ea typeface="-윤고딕310" panose="02030504000101010101" pitchFamily="18" charset="-127"/>
-                        </a:rPr>
-                        <a:t>중력을 영향을 받는 객체들이 이미지와 잘 맞는지 테스트한다</a:t>
-                      </a:r>
-                      <a:r>
-                        <a:rPr lang="en-US" altLang="ko-KR" sz="1200" dirty="0" smtClean="0">
-                          <a:latin typeface="-윤고딕310" panose="02030504000101010101" pitchFamily="18" charset="-127"/>
-                          <a:ea typeface="-윤고딕310" panose="02030504000101010101" pitchFamily="18" charset="-127"/>
-                        </a:rPr>
-                        <a:t>. </a:t>
-                      </a:r>
-                      <a:r>
-                        <a:rPr lang="ko-KR" altLang="en-US" sz="1200" dirty="0" smtClean="0">
-                          <a:latin typeface="-윤고딕310" panose="02030504000101010101" pitchFamily="18" charset="-127"/>
-                          <a:ea typeface="-윤고딕310" panose="02030504000101010101" pitchFamily="18" charset="-127"/>
-                        </a:rPr>
-                        <a:t>객체들을 배치하여 실제로 어울리는지</a:t>
-                      </a:r>
-                      <a:r>
-                        <a:rPr lang="en-US" altLang="ko-KR" sz="1200" dirty="0" smtClean="0">
-                          <a:latin typeface="-윤고딕310" panose="02030504000101010101" pitchFamily="18" charset="-127"/>
-                          <a:ea typeface="-윤고딕310" panose="02030504000101010101" pitchFamily="18" charset="-127"/>
-                        </a:rPr>
-                        <a:t>,</a:t>
-                      </a:r>
-                      <a:r>
-                        <a:rPr lang="ko-KR" altLang="en-US" sz="1200" dirty="0" smtClean="0">
-                          <a:latin typeface="-윤고딕310" panose="02030504000101010101" pitchFamily="18" charset="-127"/>
-                          <a:ea typeface="-윤고딕310" panose="02030504000101010101" pitchFamily="18" charset="-127"/>
-                        </a:rPr>
-                        <a:t> 그리고 중력</a:t>
-                      </a:r>
-                      <a:r>
-                        <a:rPr lang="en-US" altLang="ko-KR" sz="1200" dirty="0" smtClean="0">
-                          <a:latin typeface="-윤고딕310" panose="02030504000101010101" pitchFamily="18" charset="-127"/>
-                          <a:ea typeface="-윤고딕310" panose="02030504000101010101" pitchFamily="18" charset="-127"/>
-                        </a:rPr>
-                        <a:t>, </a:t>
-                      </a:r>
-                      <a:r>
-                        <a:rPr lang="ko-KR" altLang="en-US" sz="1200" dirty="0" smtClean="0">
-                          <a:latin typeface="-윤고딕310" panose="02030504000101010101" pitchFamily="18" charset="-127"/>
-                          <a:ea typeface="-윤고딕310" panose="02030504000101010101" pitchFamily="18" charset="-127"/>
-                        </a:rPr>
-                        <a:t>충돌과 속도가 작동하는지 확인한다</a:t>
-                      </a:r>
-                      <a:r>
-                        <a:rPr lang="en-US" altLang="ko-KR" sz="1200" dirty="0" smtClean="0">
-                          <a:latin typeface="-윤고딕310" panose="02030504000101010101" pitchFamily="18" charset="-127"/>
-                          <a:ea typeface="-윤고딕310" panose="02030504000101010101" pitchFamily="18" charset="-127"/>
-                        </a:rPr>
-                        <a:t>.</a:t>
-                      </a:r>
-                      <a:endParaRPr lang="ko-KR" altLang="en-US" sz="1200" dirty="0" smtClean="0">
-                        <a:latin typeface="-윤고딕310" panose="02030504000101010101" pitchFamily="18" charset="-127"/>
-                        <a:ea typeface="-윤고딕310" panose="02030504000101010101" pitchFamily="18" charset="-127"/>
-                      </a:endParaRPr>
-                    </a:p>
-                  </a:txBody>
-                  <a:tcPr marL="111605" marR="111605" marT="55802" marB="55802"/>
-                </a:tc>
-              </a:tr>
-              <a:tr h="519108">
-                <a:tc>
-                  <a:txBody>
-                    <a:bodyPr/>
-                    <a:lstStyle/>
-                    <a:p>
-                      <a:pPr algn="ctr" latinLnBrk="1"/>
-                      <a:r>
-                        <a:rPr lang="en-US" altLang="ko-KR" sz="1900" dirty="0" smtClean="0">
-                          <a:latin typeface="-윤고딕310" panose="02030504000101010101" pitchFamily="18" charset="-127"/>
-                          <a:ea typeface="-윤고딕310" panose="02030504000101010101" pitchFamily="18" charset="-127"/>
-                        </a:rPr>
-                        <a:t>3</a:t>
-                      </a:r>
-                      <a:endParaRPr lang="ko-KR" altLang="en-US" sz="1900" dirty="0">
-                        <a:latin typeface="-윤고딕310" panose="02030504000101010101" pitchFamily="18" charset="-127"/>
-                        <a:ea typeface="-윤고딕310" panose="02030504000101010101" pitchFamily="18" charset="-127"/>
-                      </a:endParaRPr>
-                    </a:p>
-                  </a:txBody>
-                  <a:tcPr marL="111605" marR="111605" marT="55802" marB="55802" anchor="ctr">
-                    <a:solidFill>
-                      <a:schemeClr val="accent1">
-                        <a:tint val="40000"/>
-                        <a:alpha val="35000"/>
-                      </a:schemeClr>
-                    </a:solidFill>
-                  </a:tcPr>
-                </a:tc>
-                <a:tc>
-                  <a:txBody>
-                    <a:bodyPr/>
-                    <a:lstStyle/>
-                    <a:p>
-                      <a:pPr marL="0" indent="0" algn="ctr" latinLnBrk="1">
-                        <a:buFont typeface="Arial" panose="020B0604020202020204" pitchFamily="34" charset="0"/>
-                        <a:buNone/>
-                      </a:pPr>
-                      <a:r>
-                        <a:rPr lang="ko-KR" altLang="en-US" sz="1200" dirty="0" smtClean="0">
-                          <a:latin typeface="-윤고딕310" panose="02030504000101010101" pitchFamily="18" charset="-127"/>
-                          <a:ea typeface="-윤고딕310" panose="02030504000101010101" pitchFamily="18" charset="-127"/>
-                        </a:rPr>
-                        <a:t>플레이어</a:t>
-                      </a:r>
-                      <a:r>
-                        <a:rPr lang="en-US" altLang="ko-KR" sz="1200" baseline="0" dirty="0" smtClean="0">
-                          <a:latin typeface="-윤고딕310" panose="02030504000101010101" pitchFamily="18" charset="-127"/>
-                          <a:ea typeface="-윤고딕310" panose="02030504000101010101" pitchFamily="18" charset="-127"/>
-                        </a:rPr>
-                        <a:t> </a:t>
-                      </a:r>
-                      <a:r>
-                        <a:rPr lang="ko-KR" altLang="en-US" sz="1200" baseline="0" dirty="0" smtClean="0">
-                          <a:latin typeface="-윤고딕310" panose="02030504000101010101" pitchFamily="18" charset="-127"/>
-                          <a:ea typeface="-윤고딕310" panose="02030504000101010101" pitchFamily="18" charset="-127"/>
-                        </a:rPr>
-                        <a:t>객체</a:t>
-                      </a:r>
-                      <a:endParaRPr lang="ko-KR" altLang="en-US" sz="1200" dirty="0">
-                        <a:latin typeface="-윤고딕310" panose="02030504000101010101" pitchFamily="18" charset="-127"/>
-                        <a:ea typeface="-윤고딕310" panose="02030504000101010101" pitchFamily="18" charset="-127"/>
-                      </a:endParaRPr>
-                    </a:p>
-                  </a:txBody>
-                  <a:tcPr marL="111605" marR="111605" marT="55802" marB="55802" anchor="ctr"/>
-                </a:tc>
-                <a:tc>
-                  <a:txBody>
-                    <a:bodyPr/>
-                    <a:lstStyle/>
-                    <a:p>
-                      <a:pPr marL="171450" indent="-171450" latinLnBrk="1">
-                        <a:buFont typeface="Arial" panose="020B0604020202020204" pitchFamily="34" charset="0"/>
-                        <a:buChar char="•"/>
-                      </a:pPr>
-                      <a:r>
-                        <a:rPr lang="ko-KR" altLang="en-US" sz="1200" dirty="0" smtClean="0">
-                          <a:latin typeface="-윤고딕310" panose="02030504000101010101" pitchFamily="18" charset="-127"/>
-                          <a:ea typeface="-윤고딕310" panose="02030504000101010101" pitchFamily="18" charset="-127"/>
-                        </a:rPr>
-                        <a:t>플레이어는 키 입력 이벤트를 받아 움직인다</a:t>
-                      </a:r>
-                      <a:r>
-                        <a:rPr lang="en-US" altLang="ko-KR" sz="1200" dirty="0" smtClean="0">
-                          <a:latin typeface="-윤고딕310" panose="02030504000101010101" pitchFamily="18" charset="-127"/>
-                          <a:ea typeface="-윤고딕310" panose="02030504000101010101" pitchFamily="18" charset="-127"/>
-                        </a:rPr>
-                        <a:t>. </a:t>
-                      </a:r>
-                      <a:r>
-                        <a:rPr lang="ko-KR" altLang="en-US" sz="1200" dirty="0" smtClean="0">
-                          <a:latin typeface="-윤고딕310" panose="02030504000101010101" pitchFamily="18" charset="-127"/>
-                          <a:ea typeface="-윤고딕310" panose="02030504000101010101" pitchFamily="18" charset="-127"/>
-                        </a:rPr>
-                        <a:t>누른 키에 따라 행동을 취하는데 처음엔 움직임만 취하도록 한다</a:t>
-                      </a:r>
-                      <a:r>
-                        <a:rPr lang="en-US" altLang="ko-KR" sz="1200" dirty="0" smtClean="0">
-                          <a:latin typeface="-윤고딕310" panose="02030504000101010101" pitchFamily="18" charset="-127"/>
-                          <a:ea typeface="-윤고딕310" panose="02030504000101010101" pitchFamily="18" charset="-127"/>
-                        </a:rPr>
-                        <a:t>.</a:t>
-                      </a:r>
-                      <a:endParaRPr lang="ko-KR" altLang="en-US" sz="1200" dirty="0">
-                        <a:latin typeface="-윤고딕310" panose="02030504000101010101" pitchFamily="18" charset="-127"/>
-                        <a:ea typeface="-윤고딕310" panose="02030504000101010101" pitchFamily="18" charset="-127"/>
-                      </a:endParaRPr>
-                    </a:p>
-                  </a:txBody>
-                  <a:tcPr marL="111605" marR="111605" marT="55802" marB="55802"/>
-                </a:tc>
-              </a:tr>
-              <a:tr h="519108">
-                <a:tc>
-                  <a:txBody>
-                    <a:bodyPr/>
-                    <a:lstStyle/>
-                    <a:p>
-                      <a:pPr algn="ctr" latinLnBrk="1"/>
-                      <a:r>
-                        <a:rPr lang="en-US" altLang="ko-KR" sz="1900" dirty="0" smtClean="0">
-                          <a:latin typeface="-윤고딕310" panose="02030504000101010101" pitchFamily="18" charset="-127"/>
-                          <a:ea typeface="-윤고딕310" panose="02030504000101010101" pitchFamily="18" charset="-127"/>
-                        </a:rPr>
-                        <a:t>4</a:t>
-                      </a:r>
-                      <a:endParaRPr lang="ko-KR" altLang="en-US" sz="1900" dirty="0">
-                        <a:latin typeface="-윤고딕310" panose="02030504000101010101" pitchFamily="18" charset="-127"/>
-                        <a:ea typeface="-윤고딕310" panose="02030504000101010101" pitchFamily="18" charset="-127"/>
-                      </a:endParaRPr>
-                    </a:p>
-                  </a:txBody>
-                  <a:tcPr marL="111605" marR="111605" marT="55802" marB="55802" anchor="ctr">
-                    <a:solidFill>
-                      <a:schemeClr val="accent1">
-                        <a:tint val="40000"/>
-                        <a:alpha val="35000"/>
-                      </a:schemeClr>
-                    </a:solidFill>
-                  </a:tcPr>
-                </a:tc>
-                <a:tc>
-                  <a:txBody>
-                    <a:bodyPr/>
-                    <a:lstStyle/>
-                    <a:p>
-                      <a:pPr marL="0" indent="0" algn="ctr" latinLnBrk="1">
-                        <a:buFont typeface="Arial" panose="020B0604020202020204" pitchFamily="34" charset="0"/>
-                        <a:buNone/>
-                      </a:pPr>
-                      <a:r>
-                        <a:rPr lang="en-US" altLang="ko-KR" sz="1200" dirty="0" smtClean="0">
-                          <a:latin typeface="-윤고딕310" panose="02030504000101010101" pitchFamily="18" charset="-127"/>
-                          <a:ea typeface="-윤고딕310" panose="02030504000101010101" pitchFamily="18" charset="-127"/>
-                        </a:rPr>
-                        <a:t>NPC</a:t>
-                      </a:r>
-                      <a:r>
-                        <a:rPr lang="en-US" altLang="ko-KR" sz="1200" baseline="0" dirty="0" smtClean="0">
-                          <a:latin typeface="-윤고딕310" panose="02030504000101010101" pitchFamily="18" charset="-127"/>
-                          <a:ea typeface="-윤고딕310" panose="02030504000101010101" pitchFamily="18" charset="-127"/>
-                        </a:rPr>
-                        <a:t> </a:t>
-                      </a:r>
-                      <a:r>
-                        <a:rPr lang="ko-KR" altLang="en-US" sz="1200" baseline="0" dirty="0" smtClean="0">
-                          <a:latin typeface="-윤고딕310" panose="02030504000101010101" pitchFamily="18" charset="-127"/>
-                          <a:ea typeface="-윤고딕310" panose="02030504000101010101" pitchFamily="18" charset="-127"/>
-                        </a:rPr>
-                        <a:t>객체와 인공지능</a:t>
-                      </a:r>
-                      <a:endParaRPr lang="ko-KR" altLang="en-US" sz="1200" dirty="0">
-                        <a:latin typeface="-윤고딕310" panose="02030504000101010101" pitchFamily="18" charset="-127"/>
-                        <a:ea typeface="-윤고딕310" panose="02030504000101010101" pitchFamily="18" charset="-127"/>
-                      </a:endParaRPr>
-                    </a:p>
-                  </a:txBody>
-                  <a:tcPr marL="111605" marR="111605" marT="55802" marB="55802" anchor="ctr"/>
-                </a:tc>
-                <a:tc>
-                  <a:txBody>
-                    <a:bodyPr/>
-                    <a:lstStyle/>
-                    <a:p>
-                      <a:pPr marL="171450" marR="0" indent="-171450" algn="l" defTabSz="914400" rtl="0" eaLnBrk="1" fontAlgn="auto" latinLnBrk="1" hangingPunct="1">
-                        <a:lnSpc>
-                          <a:spcPct val="100000"/>
-                        </a:lnSpc>
-                        <a:spcBef>
-                          <a:spcPts val="0"/>
-                        </a:spcBef>
-                        <a:spcAft>
-                          <a:spcPts val="0"/>
-                        </a:spcAft>
-                        <a:buClrTx/>
-                        <a:buSzTx/>
-                        <a:buFont typeface="Arial" panose="020B0604020202020204" pitchFamily="34" charset="0"/>
-                        <a:buChar char="•"/>
-                        <a:tabLst/>
-                        <a:defRPr/>
-                      </a:pPr>
-                      <a:r>
-                        <a:rPr lang="ko-KR" altLang="en-US" sz="1200" dirty="0" smtClean="0">
-                          <a:latin typeface="-윤고딕310" panose="02030504000101010101" pitchFamily="18" charset="-127"/>
-                          <a:ea typeface="-윤고딕310" panose="02030504000101010101" pitchFamily="18" charset="-127"/>
-                        </a:rPr>
-                        <a:t>적들은 시야가 있으며 플레이어를 발견하면 다가와 공격한다</a:t>
-                      </a:r>
-                      <a:r>
-                        <a:rPr lang="en-US" altLang="ko-KR" sz="1200" dirty="0" smtClean="0">
-                          <a:latin typeface="-윤고딕310" panose="02030504000101010101" pitchFamily="18" charset="-127"/>
-                          <a:ea typeface="-윤고딕310" panose="02030504000101010101" pitchFamily="18" charset="-127"/>
-                        </a:rPr>
-                        <a:t>. </a:t>
-                      </a:r>
-                      <a:r>
-                        <a:rPr lang="ko-KR" altLang="en-US" sz="1200" dirty="0" smtClean="0">
-                          <a:latin typeface="-윤고딕310" panose="02030504000101010101" pitchFamily="18" charset="-127"/>
-                          <a:ea typeface="-윤고딕310" panose="02030504000101010101" pitchFamily="18" charset="-127"/>
-                        </a:rPr>
-                        <a:t>적들은 대체로 단순하지만 일부 적은 까다로운 </a:t>
-                      </a:r>
-                      <a:r>
-                        <a:rPr lang="en-US" altLang="ko-KR" sz="1200" dirty="0" smtClean="0">
-                          <a:latin typeface="-윤고딕310" panose="02030504000101010101" pitchFamily="18" charset="-127"/>
-                          <a:ea typeface="-윤고딕310" panose="02030504000101010101" pitchFamily="18" charset="-127"/>
-                        </a:rPr>
-                        <a:t>(</a:t>
-                      </a:r>
-                      <a:r>
-                        <a:rPr lang="ko-KR" altLang="en-US" sz="1200" dirty="0" smtClean="0">
-                          <a:latin typeface="-윤고딕310" panose="02030504000101010101" pitchFamily="18" charset="-127"/>
-                          <a:ea typeface="-윤고딕310" panose="02030504000101010101" pitchFamily="18" charset="-127"/>
-                        </a:rPr>
-                        <a:t>하지만 반복적인</a:t>
-                      </a:r>
-                      <a:r>
-                        <a:rPr lang="en-US" altLang="ko-KR" sz="1200" dirty="0" smtClean="0">
-                          <a:latin typeface="-윤고딕310" panose="02030504000101010101" pitchFamily="18" charset="-127"/>
-                          <a:ea typeface="-윤고딕310" panose="02030504000101010101" pitchFamily="18" charset="-127"/>
-                        </a:rPr>
-                        <a:t>) </a:t>
-                      </a:r>
-                      <a:r>
-                        <a:rPr lang="ko-KR" altLang="en-US" sz="1200" dirty="0" smtClean="0">
-                          <a:latin typeface="-윤고딕310" panose="02030504000101010101" pitchFamily="18" charset="-127"/>
-                          <a:ea typeface="-윤고딕310" panose="02030504000101010101" pitchFamily="18" charset="-127"/>
-                        </a:rPr>
-                        <a:t>행동을 한다</a:t>
-                      </a:r>
-                      <a:r>
-                        <a:rPr lang="en-US" altLang="ko-KR" sz="1200" dirty="0" smtClean="0">
-                          <a:latin typeface="-윤고딕310" panose="02030504000101010101" pitchFamily="18" charset="-127"/>
-                          <a:ea typeface="-윤고딕310" panose="02030504000101010101" pitchFamily="18" charset="-127"/>
-                        </a:rPr>
-                        <a:t>.</a:t>
-                      </a:r>
-                      <a:endParaRPr lang="ko-KR" altLang="en-US" sz="1200" dirty="0" smtClean="0">
-                        <a:latin typeface="-윤고딕310" panose="02030504000101010101" pitchFamily="18" charset="-127"/>
-                        <a:ea typeface="-윤고딕310" panose="02030504000101010101" pitchFamily="18" charset="-127"/>
-                      </a:endParaRPr>
-                    </a:p>
-                  </a:txBody>
-                  <a:tcPr marL="111605" marR="111605" marT="55802" marB="55802"/>
-                </a:tc>
-              </a:tr>
-              <a:tr h="540006">
-                <a:tc>
-                  <a:txBody>
-                    <a:bodyPr/>
-                    <a:lstStyle/>
-                    <a:p>
-                      <a:pPr algn="ctr" latinLnBrk="1"/>
-                      <a:r>
-                        <a:rPr lang="en-US" altLang="ko-KR" sz="1900" dirty="0" smtClean="0">
-                          <a:latin typeface="-윤고딕310" panose="02030504000101010101" pitchFamily="18" charset="-127"/>
-                          <a:ea typeface="-윤고딕310" panose="02030504000101010101" pitchFamily="18" charset="-127"/>
-                        </a:rPr>
-                        <a:t>5</a:t>
-                      </a:r>
-                      <a:endParaRPr lang="ko-KR" altLang="en-US" sz="1900" dirty="0">
-                        <a:latin typeface="-윤고딕310" panose="02030504000101010101" pitchFamily="18" charset="-127"/>
-                        <a:ea typeface="-윤고딕310" panose="02030504000101010101" pitchFamily="18" charset="-127"/>
-                      </a:endParaRPr>
-                    </a:p>
-                  </a:txBody>
-                  <a:tcPr marL="111605" marR="111605" marT="55802" marB="55802" anchor="ctr">
-                    <a:solidFill>
-                      <a:schemeClr val="accent1">
-                        <a:tint val="40000"/>
-                        <a:alpha val="35000"/>
-                      </a:schemeClr>
-                    </a:solidFill>
-                  </a:tcPr>
-                </a:tc>
-                <a:tc>
-                  <a:txBody>
-                    <a:bodyPr/>
-                    <a:lstStyle/>
-                    <a:p>
-                      <a:pPr marL="0" indent="0" algn="ctr" latinLnBrk="1">
-                        <a:buFont typeface="Arial" panose="020B0604020202020204" pitchFamily="34" charset="0"/>
-                        <a:buNone/>
-                      </a:pPr>
-                      <a:r>
-                        <a:rPr lang="ko-KR" altLang="en-US" sz="1200" dirty="0" smtClean="0">
-                          <a:latin typeface="-윤고딕310" panose="02030504000101010101" pitchFamily="18" charset="-127"/>
-                          <a:ea typeface="-윤고딕310" panose="02030504000101010101" pitchFamily="18" charset="-127"/>
-                        </a:rPr>
-                        <a:t>객체 상호 작용 </a:t>
-                      </a:r>
-                      <a:r>
-                        <a:rPr lang="en-US" altLang="ko-KR" sz="1200" dirty="0" smtClean="0">
-                          <a:latin typeface="-윤고딕310" panose="02030504000101010101" pitchFamily="18" charset="-127"/>
-                          <a:ea typeface="-윤고딕310" panose="02030504000101010101" pitchFamily="18" charset="-127"/>
-                        </a:rPr>
-                        <a:t>1</a:t>
-                      </a:r>
-                      <a:endParaRPr lang="ko-KR" altLang="en-US" sz="1200" dirty="0">
-                        <a:latin typeface="-윤고딕310" panose="02030504000101010101" pitchFamily="18" charset="-127"/>
-                        <a:ea typeface="-윤고딕310" panose="02030504000101010101" pitchFamily="18" charset="-127"/>
-                      </a:endParaRPr>
-                    </a:p>
-                  </a:txBody>
-                  <a:tcPr marL="111605" marR="111605" marT="55802" marB="55802" anchor="ctr">
-                    <a:solidFill>
-                      <a:srgbClr val="FFF0E8"/>
-                    </a:solidFill>
-                  </a:tcPr>
-                </a:tc>
-                <a:tc>
-                  <a:txBody>
-                    <a:bodyPr/>
-                    <a:lstStyle/>
-                    <a:p>
-                      <a:pPr marL="171450" indent="-171450" latinLnBrk="1">
-                        <a:buFont typeface="Arial" panose="020B0604020202020204" pitchFamily="34" charset="0"/>
-                        <a:buChar char="•"/>
-                      </a:pPr>
-                      <a:r>
-                        <a:rPr lang="ko-KR" altLang="en-US" sz="1200" dirty="0" smtClean="0">
-                          <a:latin typeface="-윤고딕310" panose="02030504000101010101" pitchFamily="18" charset="-127"/>
-                          <a:ea typeface="-윤고딕310" panose="02030504000101010101" pitchFamily="18" charset="-127"/>
-                        </a:rPr>
-                        <a:t>플레이어와 </a:t>
-                      </a:r>
-                      <a:r>
-                        <a:rPr lang="en-US" altLang="ko-KR" sz="1200" dirty="0" smtClean="0">
-                          <a:latin typeface="-윤고딕310" panose="02030504000101010101" pitchFamily="18" charset="-127"/>
-                          <a:ea typeface="-윤고딕310" panose="02030504000101010101" pitchFamily="18" charset="-127"/>
-                        </a:rPr>
-                        <a:t>NPC, NPC </a:t>
-                      </a:r>
-                      <a:r>
-                        <a:rPr lang="ko-KR" altLang="en-US" sz="1200" dirty="0" smtClean="0">
-                          <a:latin typeface="-윤고딕310" panose="02030504000101010101" pitchFamily="18" charset="-127"/>
-                          <a:ea typeface="-윤고딕310" panose="02030504000101010101" pitchFamily="18" charset="-127"/>
-                        </a:rPr>
-                        <a:t>와 </a:t>
-                      </a:r>
-                      <a:r>
-                        <a:rPr lang="en-US" altLang="ko-KR" sz="1200" dirty="0" smtClean="0">
-                          <a:latin typeface="-윤고딕310" panose="02030504000101010101" pitchFamily="18" charset="-127"/>
-                          <a:ea typeface="-윤고딕310" panose="02030504000101010101" pitchFamily="18" charset="-127"/>
-                        </a:rPr>
-                        <a:t>NPC </a:t>
-                      </a:r>
-                      <a:r>
-                        <a:rPr lang="ko-KR" altLang="en-US" sz="1200" dirty="0" smtClean="0">
-                          <a:latin typeface="-윤고딕310" panose="02030504000101010101" pitchFamily="18" charset="-127"/>
-                          <a:ea typeface="-윤고딕310" panose="02030504000101010101" pitchFamily="18" charset="-127"/>
-                        </a:rPr>
-                        <a:t>등등 객체들끼리의 상호 작용을</a:t>
-                      </a:r>
-                      <a:r>
-                        <a:rPr lang="ko-KR" altLang="en-US" sz="1200" baseline="0" dirty="0" smtClean="0">
-                          <a:latin typeface="-윤고딕310" panose="02030504000101010101" pitchFamily="18" charset="-127"/>
-                          <a:ea typeface="-윤고딕310" panose="02030504000101010101" pitchFamily="18" charset="-127"/>
-                        </a:rPr>
-                        <a:t> 구현한다</a:t>
-                      </a:r>
-                      <a:r>
-                        <a:rPr lang="en-US" altLang="ko-KR" sz="1200" baseline="0" dirty="0" smtClean="0">
-                          <a:latin typeface="-윤고딕310" panose="02030504000101010101" pitchFamily="18" charset="-127"/>
-                          <a:ea typeface="-윤고딕310" panose="02030504000101010101" pitchFamily="18" charset="-127"/>
-                        </a:rPr>
-                        <a:t>. </a:t>
-                      </a:r>
-                      <a:r>
-                        <a:rPr lang="ko-KR" altLang="en-US" sz="1200" baseline="0" dirty="0" smtClean="0">
-                          <a:latin typeface="-윤고딕310" panose="02030504000101010101" pitchFamily="18" charset="-127"/>
-                          <a:ea typeface="-윤고딕310" panose="02030504000101010101" pitchFamily="18" charset="-127"/>
-                        </a:rPr>
-                        <a:t>피격</a:t>
-                      </a:r>
-                      <a:r>
-                        <a:rPr lang="en-US" altLang="ko-KR" sz="1200" baseline="0" dirty="0" smtClean="0">
-                          <a:latin typeface="-윤고딕310" panose="02030504000101010101" pitchFamily="18" charset="-127"/>
-                          <a:ea typeface="-윤고딕310" panose="02030504000101010101" pitchFamily="18" charset="-127"/>
-                        </a:rPr>
-                        <a:t>, </a:t>
-                      </a:r>
-                      <a:r>
-                        <a:rPr lang="ko-KR" altLang="en-US" sz="1200" baseline="0" dirty="0" smtClean="0">
-                          <a:latin typeface="-윤고딕310" panose="02030504000101010101" pitchFamily="18" charset="-127"/>
-                          <a:ea typeface="-윤고딕310" panose="02030504000101010101" pitchFamily="18" charset="-127"/>
-                        </a:rPr>
-                        <a:t>공격</a:t>
-                      </a:r>
-                      <a:r>
-                        <a:rPr lang="en-US" altLang="ko-KR" sz="1200" baseline="0" dirty="0" smtClean="0">
-                          <a:latin typeface="-윤고딕310" panose="02030504000101010101" pitchFamily="18" charset="-127"/>
-                          <a:ea typeface="-윤고딕310" panose="02030504000101010101" pitchFamily="18" charset="-127"/>
-                        </a:rPr>
-                        <a:t>, </a:t>
-                      </a:r>
-                      <a:r>
-                        <a:rPr lang="ko-KR" altLang="en-US" sz="1200" baseline="0" dirty="0" smtClean="0">
-                          <a:latin typeface="-윤고딕310" panose="02030504000101010101" pitchFamily="18" charset="-127"/>
-                          <a:ea typeface="-윤고딕310" panose="02030504000101010101" pitchFamily="18" charset="-127"/>
-                        </a:rPr>
-                        <a:t>사망</a:t>
-                      </a:r>
-                      <a:r>
-                        <a:rPr lang="en-US" altLang="ko-KR" sz="1200" baseline="0" dirty="0" smtClean="0">
-                          <a:latin typeface="-윤고딕310" panose="02030504000101010101" pitchFamily="18" charset="-127"/>
-                          <a:ea typeface="-윤고딕310" panose="02030504000101010101" pitchFamily="18" charset="-127"/>
-                        </a:rPr>
-                        <a:t>, </a:t>
-                      </a:r>
-                      <a:r>
-                        <a:rPr lang="ko-KR" altLang="en-US" sz="1200" baseline="0" dirty="0" smtClean="0">
-                          <a:latin typeface="-윤고딕310" panose="02030504000101010101" pitchFamily="18" charset="-127"/>
-                          <a:ea typeface="-윤고딕310" panose="02030504000101010101" pitchFamily="18" charset="-127"/>
-                        </a:rPr>
-                        <a:t>등의 상호작용은 충돌할 때 일어난다</a:t>
-                      </a:r>
-                      <a:r>
-                        <a:rPr lang="en-US" altLang="ko-KR" sz="1200" baseline="0" dirty="0" smtClean="0">
-                          <a:latin typeface="-윤고딕310" panose="02030504000101010101" pitchFamily="18" charset="-127"/>
-                          <a:ea typeface="-윤고딕310" panose="02030504000101010101" pitchFamily="18" charset="-127"/>
-                        </a:rPr>
-                        <a:t>.</a:t>
-                      </a:r>
-                    </a:p>
-                    <a:p>
-                      <a:pPr marL="171450" indent="-171450" latinLnBrk="1">
-                        <a:buFont typeface="Arial" panose="020B0604020202020204" pitchFamily="34" charset="0"/>
-                        <a:buChar char="•"/>
-                      </a:pPr>
-                      <a:endParaRPr lang="ko-KR" altLang="en-US" sz="1200" dirty="0">
-                        <a:latin typeface="-윤고딕310" panose="02030504000101010101" pitchFamily="18" charset="-127"/>
-                        <a:ea typeface="-윤고딕310" panose="02030504000101010101" pitchFamily="18" charset="-127"/>
-                      </a:endParaRPr>
-                    </a:p>
-                  </a:txBody>
-                  <a:tcPr marL="111605" marR="111605" marT="55802" marB="55802">
-                    <a:solidFill>
-                      <a:srgbClr val="FFF0E8"/>
-                    </a:solidFill>
-                  </a:tcPr>
-                </a:tc>
-              </a:tr>
-            </a:tbl>
-          </a:graphicData>
-        </a:graphic>
-      </p:graphicFrame>
-      <p:sp>
-        <p:nvSpPr>
-          <p:cNvPr id="4" name="날짜 개체 틀 3"/>
-          <p:cNvSpPr>
-            <a:spLocks noGrp="1"/>
-          </p:cNvSpPr>
-          <p:nvPr>
-            <p:ph type="dt" sz="half" idx="10"/>
-          </p:nvPr>
-        </p:nvSpPr>
-        <p:spPr>
-          <a:xfrm>
-            <a:off x="6452730" y="5877272"/>
-            <a:ext cx="1213821" cy="365125"/>
-          </a:xfrm>
-        </p:spPr>
-        <p:txBody>
-          <a:bodyPr/>
-          <a:lstStyle/>
-          <a:p>
-            <a:fld id="{E63BED42-B56B-487C-A576-F8E55AE26EFB}" type="datetime1">
-              <a:rPr lang="ko-KR" altLang="en-US" smtClean="0"/>
-              <a:t>2017-10-23</a:t>
-            </a:fld>
-            <a:endParaRPr lang="ko-KR" altLang="en-US"/>
-          </a:p>
-        </p:txBody>
-      </p:sp>
-      <p:sp>
-        <p:nvSpPr>
-          <p:cNvPr id="5" name="슬라이드 번호 개체 틀 4"/>
-          <p:cNvSpPr>
-            <a:spLocks noGrp="1"/>
-          </p:cNvSpPr>
-          <p:nvPr>
-            <p:ph type="sldNum" sz="quarter" idx="12"/>
-          </p:nvPr>
-        </p:nvSpPr>
-        <p:spPr>
-          <a:xfrm>
-            <a:off x="7668344" y="5877272"/>
-            <a:ext cx="554023" cy="365125"/>
-          </a:xfrm>
-        </p:spPr>
-        <p:txBody>
-          <a:bodyPr/>
-          <a:lstStyle/>
-          <a:p>
-            <a:fld id="{8ED71C24-08E4-4AF3-BCF3-1A22B934883E}" type="slidenum">
-              <a:rPr lang="ko-KR" altLang="en-US" smtClean="0"/>
-              <a:t>10</a:t>
-            </a:fld>
-            <a:endParaRPr lang="ko-KR" altLang="en-US"/>
-          </a:p>
-        </p:txBody>
-      </p:sp>
-      <p:sp>
-        <p:nvSpPr>
-          <p:cNvPr id="6" name="바닥글 개체 틀 5"/>
-          <p:cNvSpPr>
-            <a:spLocks noGrp="1"/>
-          </p:cNvSpPr>
-          <p:nvPr>
-            <p:ph type="ftr" sz="quarter" idx="11"/>
-          </p:nvPr>
-        </p:nvSpPr>
-        <p:spPr>
-          <a:xfrm>
-            <a:off x="912543" y="5877272"/>
-            <a:ext cx="5540188" cy="365125"/>
-          </a:xfrm>
-        </p:spPr>
-        <p:txBody>
-          <a:bodyPr/>
-          <a:lstStyle/>
-          <a:p>
-            <a:r>
-              <a:rPr lang="en-US" altLang="ko-KR" dirty="0" smtClean="0">
-                <a:solidFill>
-                  <a:srgbClr val="C00000"/>
-                </a:solidFill>
-                <a:latin typeface="-윤고딕310" panose="02030504000101010101" pitchFamily="18" charset="-127"/>
-                <a:ea typeface="-윤고딕310" panose="02030504000101010101" pitchFamily="18" charset="-127"/>
-              </a:rPr>
-              <a:t>2D </a:t>
-            </a:r>
-            <a:r>
-              <a:rPr lang="ko-KR" altLang="en-US" dirty="0" smtClean="0">
-                <a:solidFill>
-                  <a:srgbClr val="C00000"/>
-                </a:solidFill>
-                <a:latin typeface="-윤고딕310" panose="02030504000101010101" pitchFamily="18" charset="-127"/>
-                <a:ea typeface="-윤고딕310" panose="02030504000101010101" pitchFamily="18" charset="-127"/>
-              </a:rPr>
-              <a:t>게임 프로그래밍</a:t>
-            </a:r>
-            <a:endParaRPr lang="ko-KR" altLang="en-US" dirty="0">
-              <a:solidFill>
-                <a:srgbClr val="C00000"/>
-              </a:solidFill>
-              <a:latin typeface="-윤고딕310" panose="02030504000101010101" pitchFamily="18" charset="-127"/>
-              <a:ea typeface="-윤고딕310" panose="02030504000101010101" pitchFamily="18" charset="-127"/>
-            </a:endParaRPr>
-          </a:p>
-        </p:txBody>
-      </p:sp>
-    </p:spTree>
-    <p:extLst>
-      <p:ext uri="{BB962C8B-B14F-4D97-AF65-F5344CB8AC3E}">
-        <p14:creationId xmlns:p14="http://schemas.microsoft.com/office/powerpoint/2010/main" val="362600760"/>
-      </p:ext>
-    </p:extLst>
-  </p:cSld>
-  <p:clrMapOvr>
-    <a:masterClrMapping/>
-  </p:clrMapOvr>
-  <p:timing>
-    <p:tnLst>
-      <p:par>
-        <p:cTn id="1" dur="indefinite" restart="never" nodeType="tmRoot"/>
-      </p:par>
-    </p:tnLst>
-  </p:timing>
-</p:sld>
-</file>
-
-<file path=ppt/slides/slide11.xml><?xml version="1.0" encoding="utf-8"?>
-<p:sld xmlns:a="http://schemas.openxmlformats.org/drawingml/2006/main" xmlns:r="http://schemas.openxmlformats.org/officeDocument/2006/relationships" xmlns:p="http://schemas.openxmlformats.org/presentationml/2006/main">
-  <p:cSld>
-    <p:spTree>
-      <p:nvGrpSpPr>
-        <p:cNvPr id="1" name=""/>
-        <p:cNvGrpSpPr/>
-        <p:nvPr/>
-      </p:nvGrpSpPr>
-      <p:grpSpPr>
-        <a:xfrm>
-          <a:off x="0" y="0"/>
-          <a:ext cx="0" cy="0"/>
-          <a:chOff x="0" y="0"/>
-          <a:chExt cx="0" cy="0"/>
-        </a:xfrm>
-      </p:grpSpPr>
-      <p:sp>
-        <p:nvSpPr>
-          <p:cNvPr id="2" name="제목 1"/>
-          <p:cNvSpPr>
-            <a:spLocks noGrp="1"/>
-          </p:cNvSpPr>
-          <p:nvPr>
-            <p:ph type="title"/>
-          </p:nvPr>
-        </p:nvSpPr>
-        <p:spPr>
-          <a:xfrm>
-            <a:off x="1115616" y="980728"/>
-            <a:ext cx="6965245" cy="1202485"/>
-          </a:xfrm>
-        </p:spPr>
-        <p:txBody>
-          <a:bodyPr anchor="t"/>
-          <a:lstStyle/>
-          <a:p>
-            <a:r>
-              <a:rPr lang="ko-KR" altLang="en-US" dirty="0" smtClean="0">
-                <a:latin typeface="-윤고딕320" panose="02030504000101010101" pitchFamily="18" charset="-127"/>
-                <a:ea typeface="-윤고딕320" panose="02030504000101010101" pitchFamily="18" charset="-127"/>
-              </a:rPr>
-              <a:t>개발 일정 </a:t>
-            </a:r>
-            <a:r>
-              <a:rPr lang="en-US" altLang="ko-KR" dirty="0" smtClean="0">
-                <a:latin typeface="-윤고딕320" panose="02030504000101010101" pitchFamily="18" charset="-127"/>
-                <a:ea typeface="-윤고딕320" panose="02030504000101010101" pitchFamily="18" charset="-127"/>
-              </a:rPr>
               <a:t>(2)</a:t>
             </a:r>
             <a:endParaRPr lang="ko-KR" altLang="en-US" dirty="0">
@@ -10972,7 +9775,7 @@
           <a:p>
             <a:fld id="{E63BED42-B56B-487C-A576-F8E55AE26EFB}" type="datetime1">
               <a:rPr lang="ko-KR" altLang="en-US" smtClean="0"/>
-              <a:t>2017-10-23</a:t>
+              <a:t>2017-10-27</a:t>
             </a:fld>
             <a:endParaRPr lang="ko-KR" altLang="en-US"/>
           </a:p>
@@ -11000,7 +9803,7 @@
           <a:p>
             <a:fld id="{8ED71C24-08E4-4AF3-BCF3-1A22B934883E}" type="slidenum">
               <a:rPr lang="ko-KR" altLang="en-US" smtClean="0"/>
-              <a:t>11</a:t>
+              <a:t>10</a:t>
             </a:fld>
             <a:endParaRPr lang="ko-KR" altLang="en-US"/>
           </a:p>
@@ -11060,6 +9863,100 @@
     <p:extLst>
       <p:ext uri="{BB962C8B-B14F-4D97-AF65-F5344CB8AC3E}">
         <p14:creationId xmlns:p14="http://schemas.microsoft.com/office/powerpoint/2010/main" val="4146251140"/>
+      </p:ext>
+    </p:extLst>
+  </p:cSld>
+  <p:clrMapOvr>
+    <a:masterClrMapping/>
+  </p:clrMapOvr>
+  <p:timing>
+    <p:tnLst>
+      <p:par>
+        <p:cTn id="1" dur="indefinite" restart="never" nodeType="tmRoot"/>
+      </p:par>
+    </p:tnLst>
+  </p:timing>
+</p:sld>
+</file>
+
+<file path=ppt/slides/slide11.xml><?xml version="1.0" encoding="utf-8"?>
+<p:sld xmlns:a="http://schemas.openxmlformats.org/drawingml/2006/main" xmlns:r="http://schemas.openxmlformats.org/officeDocument/2006/relationships" xmlns:p="http://schemas.openxmlformats.org/presentationml/2006/main">
+  <p:cSld>
+    <p:spTree>
+      <p:nvGrpSpPr>
+        <p:cNvPr id="1" name=""/>
+        <p:cNvGrpSpPr/>
+        <p:nvPr/>
+      </p:nvGrpSpPr>
+      <p:grpSpPr>
+        <a:xfrm>
+          <a:off x="0" y="0"/>
+          <a:ext cx="0" cy="0"/>
+          <a:chOff x="0" y="0"/>
+          <a:chExt cx="0" cy="0"/>
+        </a:xfrm>
+      </p:grpSpPr>
+      <p:sp>
+        <p:nvSpPr>
+          <p:cNvPr id="2" name="제목 1"/>
+          <p:cNvSpPr>
+            <a:spLocks noGrp="1"/>
+          </p:cNvSpPr>
+          <p:nvPr>
+            <p:ph type="ctrTitle"/>
+          </p:nvPr>
+        </p:nvSpPr>
+        <p:spPr/>
+        <p:txBody>
+          <a:bodyPr>
+            <a:normAutofit/>
+          </a:bodyPr>
+          <a:lstStyle/>
+          <a:p>
+            <a:r>
+              <a:rPr lang="ko-KR" altLang="en-US" sz="4000" dirty="0" smtClean="0">
+                <a:latin typeface="-윤고딕330" panose="02030504000101010101" pitchFamily="18" charset="-127"/>
+                <a:ea typeface="-윤고딕330" panose="02030504000101010101" pitchFamily="18" charset="-127"/>
+              </a:rPr>
+              <a:t>봐주셔서 감사합니다</a:t>
+            </a:r>
+            <a:r>
+              <a:rPr lang="en-US" altLang="ko-KR" sz="4000" dirty="0" smtClean="0">
+                <a:latin typeface="-윤고딕330" panose="02030504000101010101" pitchFamily="18" charset="-127"/>
+                <a:ea typeface="-윤고딕330" panose="02030504000101010101" pitchFamily="18" charset="-127"/>
+              </a:rPr>
+              <a:t>.</a:t>
+            </a:r>
+            <a:endParaRPr lang="ko-KR" altLang="en-US" sz="4000" dirty="0">
+              <a:latin typeface="-윤고딕330" panose="02030504000101010101" pitchFamily="18" charset="-127"/>
+              <a:ea typeface="-윤고딕330" panose="02030504000101010101" pitchFamily="18" charset="-127"/>
+            </a:endParaRPr>
+          </a:p>
+        </p:txBody>
+      </p:sp>
+      <p:sp>
+        <p:nvSpPr>
+          <p:cNvPr id="3" name="부제목 2"/>
+          <p:cNvSpPr>
+            <a:spLocks noGrp="1"/>
+          </p:cNvSpPr>
+          <p:nvPr>
+            <p:ph type="subTitle" idx="1"/>
+          </p:nvPr>
+        </p:nvSpPr>
+        <p:spPr/>
+        <p:txBody>
+          <a:bodyPr/>
+          <a:lstStyle/>
+          <a:p>
+            <a:endParaRPr lang="ko-KR" altLang="en-US"/>
+          </a:p>
+        </p:txBody>
+      </p:sp>
+    </p:spTree>
+    <p:extLst>
+      <p:ext uri="{BB962C8B-B14F-4D97-AF65-F5344CB8AC3E}">
+        <p14:creationId xmlns:p14="http://schemas.microsoft.com/office/powerpoint/2010/main" val="3055984076"/>
       </p:ext>
     </p:extLst>
   </p:cSld>
@@ -11113,328 +10010,6 @@
                 <a:latin typeface="-윤고딕320" panose="02030504000101010101" pitchFamily="18" charset="-127"/>
                 <a:ea typeface="-윤고딕320" panose="02030504000101010101" pitchFamily="18" charset="-127"/>
               </a:rPr>
-              <a:t>자료 출처</a:t>
-            </a:r>
-            <a:endParaRPr lang="ko-KR" altLang="en-US" dirty="0">
-              <a:latin typeface="-윤고딕320" panose="02030504000101010101" pitchFamily="18" charset="-127"/>
-              <a:ea typeface="-윤고딕320" panose="02030504000101010101" pitchFamily="18" charset="-127"/>
-            </a:endParaRPr>
-          </a:p>
-        </p:txBody>
-      </p:sp>
-      <p:sp>
-        <p:nvSpPr>
-          <p:cNvPr id="3" name="내용 개체 틀 2"/>
-          <p:cNvSpPr>
-            <a:spLocks noGrp="1"/>
-          </p:cNvSpPr>
-          <p:nvPr>
-            <p:ph idx="1"/>
-          </p:nvPr>
-        </p:nvSpPr>
-        <p:spPr/>
-        <p:txBody>
-          <a:bodyPr>
-            <a:normAutofit/>
-          </a:bodyPr>
-          <a:lstStyle/>
-          <a:p>
-            <a:r>
-              <a:rPr lang="ko-KR" altLang="en-US" sz="2100" dirty="0" smtClean="0">
-                <a:latin typeface="-윤고딕310" panose="02030504000101010101" pitchFamily="18" charset="-127"/>
-                <a:ea typeface="-윤고딕310" panose="02030504000101010101" pitchFamily="18" charset="-127"/>
-              </a:rPr>
-              <a:t>동굴 이야기</a:t>
-            </a:r>
-            <a:r>
-              <a:rPr lang="en-US" altLang="ko-KR" sz="2100" dirty="0">
-                <a:latin typeface="-윤고딕310" panose="02030504000101010101" pitchFamily="18" charset="-127"/>
-                <a:ea typeface="-윤고딕310" panose="02030504000101010101" pitchFamily="18" charset="-127"/>
-              </a:rPr>
-              <a:t>:</a:t>
-            </a:r>
-            <a:br>
-              <a:rPr lang="en-US" altLang="ko-KR" sz="2100" dirty="0">
-                <a:latin typeface="-윤고딕310" panose="02030504000101010101" pitchFamily="18" charset="-127"/>
-                <a:ea typeface="-윤고딕310" panose="02030504000101010101" pitchFamily="18" charset="-127"/>
-              </a:rPr>
-            </a:br>
-            <a:r>
-              <a:rPr lang="en-US" altLang="ko-KR" sz="2100" dirty="0">
-                <a:latin typeface="-윤고딕310" panose="02030504000101010101" pitchFamily="18" charset="-127"/>
-                <a:ea typeface="-윤고딕310" panose="02030504000101010101" pitchFamily="18" charset="-127"/>
-                <a:hlinkClick r:id="rId2"/>
-              </a:rPr>
-              <a:t>http://team-sm.tistory.com/category/?page=2</a:t>
-            </a:r>
-            <a:r>
-              <a:rPr lang="en-US" altLang="ko-KR" sz="2100" dirty="0">
-                <a:latin typeface="-윤고딕310" panose="02030504000101010101" pitchFamily="18" charset="-127"/>
-                <a:ea typeface="-윤고딕310" panose="02030504000101010101" pitchFamily="18" charset="-127"/>
-              </a:rPr>
-              <a:t/>
-            </a:r>
-            <a:br>
-              <a:rPr lang="en-US" altLang="ko-KR" sz="2100" dirty="0">
-                <a:latin typeface="-윤고딕310" panose="02030504000101010101" pitchFamily="18" charset="-127"/>
-                <a:ea typeface="-윤고딕310" panose="02030504000101010101" pitchFamily="18" charset="-127"/>
-              </a:rPr>
-            </a:br>
-            <a:r>
-              <a:rPr lang="en-US" altLang="ko-KR" sz="2100" dirty="0" smtClean="0">
-                <a:latin typeface="-윤고딕310" panose="02030504000101010101" pitchFamily="18" charset="-127"/>
-                <a:ea typeface="-윤고딕310" panose="02030504000101010101" pitchFamily="18" charset="-127"/>
-                <a:hlinkClick r:id="rId3"/>
-              </a:rPr>
-              <a:t>https</a:t>
-            </a:r>
-            <a:r>
-              <a:rPr lang="en-US" altLang="ko-KR" sz="2100">
-                <a:latin typeface="-윤고딕310" panose="02030504000101010101" pitchFamily="18" charset="-127"/>
-                <a:ea typeface="-윤고딕310" panose="02030504000101010101" pitchFamily="18" charset="-127"/>
-                <a:hlinkClick r:id="rId3"/>
-              </a:rPr>
-              <a:t>://</a:t>
-            </a:r>
-            <a:r>
-              <a:rPr lang="en-US" altLang="ko-KR" sz="2100" smtClean="0">
-                <a:latin typeface="-윤고딕310" panose="02030504000101010101" pitchFamily="18" charset="-127"/>
-                <a:ea typeface="-윤고딕310" panose="02030504000101010101" pitchFamily="18" charset="-127"/>
-                <a:hlinkClick r:id="rId3"/>
-              </a:rPr>
-              <a:t>www31.atwiki.jp/cavestory006/pages/77.html</a:t>
-            </a:r>
-            <a:endParaRPr lang="en-US" altLang="ko-KR" sz="2100" dirty="0" smtClean="0">
-              <a:latin typeface="-윤고딕310" panose="02030504000101010101" pitchFamily="18" charset="-127"/>
-              <a:ea typeface="-윤고딕310" panose="02030504000101010101" pitchFamily="18" charset="-127"/>
-            </a:endParaRPr>
-          </a:p>
-        </p:txBody>
-      </p:sp>
-      <p:sp>
-        <p:nvSpPr>
-          <p:cNvPr id="4" name="날짜 개체 틀 3"/>
-          <p:cNvSpPr>
-            <a:spLocks noGrp="1"/>
-          </p:cNvSpPr>
-          <p:nvPr>
-            <p:ph type="dt" sz="half" idx="10"/>
-          </p:nvPr>
-        </p:nvSpPr>
-        <p:spPr/>
-        <p:txBody>
-          <a:bodyPr/>
-          <a:lstStyle/>
-          <a:p>
-            <a:fld id="{8998F1EC-F01B-4CCC-A0E8-CD7012E5E6C0}" type="datetime1">
-              <a:rPr lang="ko-KR" altLang="en-US" smtClean="0"/>
-              <a:t>2017-10-23</a:t>
-            </a:fld>
-            <a:endParaRPr lang="ko-KR" altLang="en-US" dirty="0"/>
-          </a:p>
-        </p:txBody>
-      </p:sp>
-      <p:sp>
-        <p:nvSpPr>
-          <p:cNvPr id="5" name="바닥글 개체 틀 4"/>
-          <p:cNvSpPr>
-            <a:spLocks noGrp="1"/>
-          </p:cNvSpPr>
-          <p:nvPr>
-            <p:ph type="ftr" sz="quarter" idx="11"/>
-          </p:nvPr>
-        </p:nvSpPr>
-        <p:spPr/>
-        <p:txBody>
-          <a:bodyPr/>
-          <a:lstStyle/>
-          <a:p>
-            <a:r>
-              <a:rPr lang="en-US" altLang="ko-KR" smtClean="0"/>
-              <a:t>2D </a:t>
-            </a:r>
-            <a:r>
-              <a:rPr lang="ko-KR" altLang="en-US" smtClean="0"/>
-              <a:t>게임 프로그래밍</a:t>
-            </a:r>
-            <a:endParaRPr lang="ko-KR" altLang="en-US"/>
-          </a:p>
-        </p:txBody>
-      </p:sp>
-      <p:sp>
-        <p:nvSpPr>
-          <p:cNvPr id="6" name="슬라이드 번호 개체 틀 5"/>
-          <p:cNvSpPr>
-            <a:spLocks noGrp="1"/>
-          </p:cNvSpPr>
-          <p:nvPr>
-            <p:ph type="sldNum" sz="quarter" idx="12"/>
-          </p:nvPr>
-        </p:nvSpPr>
-        <p:spPr/>
-        <p:txBody>
-          <a:bodyPr/>
-          <a:lstStyle/>
-          <a:p>
-            <a:fld id="{8ED71C24-08E4-4AF3-BCF3-1A22B934883E}" type="slidenum">
-              <a:rPr lang="ko-KR" altLang="en-US" smtClean="0"/>
-              <a:t>12</a:t>
-            </a:fld>
-            <a:endParaRPr lang="ko-KR" altLang="en-US"/>
-          </a:p>
-        </p:txBody>
-      </p:sp>
-    </p:spTree>
-    <p:extLst>
-      <p:ext uri="{BB962C8B-B14F-4D97-AF65-F5344CB8AC3E}">
-        <p14:creationId xmlns:p14="http://schemas.microsoft.com/office/powerpoint/2010/main" val="1392379696"/>
-      </p:ext>
-    </p:extLst>
-  </p:cSld>
-  <p:clrMapOvr>
-    <a:masterClrMapping/>
-  </p:clrMapOvr>
-  <p:timing>
-    <p:tnLst>
-      <p:par>
-        <p:cTn id="1" dur="indefinite" restart="never" nodeType="tmRoot"/>
-      </p:par>
-    </p:tnLst>
-  </p:timing>
-</p:sld>
-</file>
-
-<file path=ppt/slides/slide13.xml><?xml version="1.0" encoding="utf-8"?>
-<p:sld xmlns:a="http://schemas.openxmlformats.org/drawingml/2006/main" xmlns:r="http://schemas.openxmlformats.org/officeDocument/2006/relationships" xmlns:p="http://schemas.openxmlformats.org/presentationml/2006/main">
-  <p:cSld>
-    <p:spTree>
-      <p:nvGrpSpPr>
-        <p:cNvPr id="1" name=""/>
-        <p:cNvGrpSpPr/>
-        <p:nvPr/>
-      </p:nvGrpSpPr>
-      <p:grpSpPr>
-        <a:xfrm>
-          <a:off x="0" y="0"/>
-          <a:ext cx="0" cy="0"/>
-          <a:chOff x="0" y="0"/>
-          <a:chExt cx="0" cy="0"/>
-        </a:xfrm>
-      </p:grpSpPr>
-      <p:sp>
-        <p:nvSpPr>
-          <p:cNvPr id="2" name="제목 1"/>
-          <p:cNvSpPr>
-            <a:spLocks noGrp="1"/>
-          </p:cNvSpPr>
-          <p:nvPr>
-            <p:ph type="ctrTitle"/>
-          </p:nvPr>
-        </p:nvSpPr>
-        <p:spPr/>
-        <p:txBody>
-          <a:bodyPr>
-            <a:normAutofit/>
-          </a:bodyPr>
-          <a:lstStyle/>
-          <a:p>
-            <a:r>
-              <a:rPr lang="ko-KR" altLang="en-US" sz="4000" dirty="0" smtClean="0">
-                <a:latin typeface="-윤고딕330" panose="02030504000101010101" pitchFamily="18" charset="-127"/>
-                <a:ea typeface="-윤고딕330" panose="02030504000101010101" pitchFamily="18" charset="-127"/>
-              </a:rPr>
-              <a:t>봐주셔서 감사합니다</a:t>
-            </a:r>
-            <a:r>
-              <a:rPr lang="en-US" altLang="ko-KR" sz="4000" dirty="0" smtClean="0">
-                <a:latin typeface="-윤고딕330" panose="02030504000101010101" pitchFamily="18" charset="-127"/>
-                <a:ea typeface="-윤고딕330" panose="02030504000101010101" pitchFamily="18" charset="-127"/>
-              </a:rPr>
-              <a:t>.</a:t>
-            </a:r>
-            <a:endParaRPr lang="ko-KR" altLang="en-US" sz="4000" dirty="0">
-              <a:latin typeface="-윤고딕330" panose="02030504000101010101" pitchFamily="18" charset="-127"/>
-              <a:ea typeface="-윤고딕330" panose="02030504000101010101" pitchFamily="18" charset="-127"/>
-            </a:endParaRPr>
-          </a:p>
-        </p:txBody>
-      </p:sp>
-      <p:sp>
-        <p:nvSpPr>
-          <p:cNvPr id="3" name="부제목 2"/>
-          <p:cNvSpPr>
-            <a:spLocks noGrp="1"/>
-          </p:cNvSpPr>
-          <p:nvPr>
-            <p:ph type="subTitle" idx="1"/>
-          </p:nvPr>
-        </p:nvSpPr>
-        <p:spPr/>
-        <p:txBody>
-          <a:bodyPr/>
-          <a:lstStyle/>
-          <a:p>
-            <a:endParaRPr lang="ko-KR" altLang="en-US"/>
-          </a:p>
-        </p:txBody>
-      </p:sp>
-    </p:spTree>
-    <p:extLst>
-      <p:ext uri="{BB962C8B-B14F-4D97-AF65-F5344CB8AC3E}">
-        <p14:creationId xmlns:p14="http://schemas.microsoft.com/office/powerpoint/2010/main" val="3055984076"/>
-      </p:ext>
-    </p:extLst>
-  </p:cSld>
-  <p:clrMapOvr>
-    <a:masterClrMapping/>
-  </p:clrMapOvr>
-  <p:timing>
-    <p:tnLst>
-      <p:par>
-        <p:cTn id="1" dur="indefinite" restart="never" nodeType="tmRoot"/>
-      </p:par>
-    </p:tnLst>
-  </p:timing>
-</p:sld>
-</file>
-
-<file path=ppt/slides/slide14.xml><?xml version="1.0" encoding="utf-8"?>
-<p:sld xmlns:a="http://schemas.openxmlformats.org/drawingml/2006/main" xmlns:r="http://schemas.openxmlformats.org/officeDocument/2006/relationships" xmlns:p="http://schemas.openxmlformats.org/presentationml/2006/main">
-  <p:cSld>
-    <p:spTree>
-      <p:nvGrpSpPr>
-        <p:cNvPr id="1" name=""/>
-        <p:cNvGrpSpPr/>
-        <p:nvPr/>
-      </p:nvGrpSpPr>
-      <p:grpSpPr>
-        <a:xfrm>
-          <a:off x="0" y="0"/>
-          <a:ext cx="0" cy="0"/>
-          <a:chOff x="0" y="0"/>
-          <a:chExt cx="0" cy="0"/>
-        </a:xfrm>
-      </p:grpSpPr>
-      <p:sp>
-        <p:nvSpPr>
-          <p:cNvPr id="2" name="제목 1"/>
-          <p:cNvSpPr>
-            <a:spLocks noGrp="1"/>
-          </p:cNvSpPr>
-          <p:nvPr>
-            <p:ph type="title"/>
-          </p:nvPr>
-        </p:nvSpPr>
-        <p:spPr/>
-        <p:txBody>
-          <a:bodyPr/>
-          <a:lstStyle/>
-          <a:p>
-            <a:r>
-              <a:rPr lang="ko-KR" altLang="en-US" dirty="0" smtClean="0">
-                <a:latin typeface="-윤고딕320" panose="02030504000101010101" pitchFamily="18" charset="-127"/>
-                <a:ea typeface="-윤고딕320" panose="02030504000101010101" pitchFamily="18" charset="-127"/>
-              </a:rPr>
               <a:t>자체 평가</a:t>
             </a:r>
             <a:endParaRPr lang="ko-KR" altLang="en-US" dirty="0">
@@ -11972,7 +10547,7 @@
           <a:p>
             <a:fld id="{E64E4686-FFDF-4469-BE9B-A5EC149CF7A5}" type="datetime1">
               <a:rPr lang="ko-KR" altLang="en-US" smtClean="0"/>
-              <a:t>2017-10-23</a:t>
+              <a:t>2017-10-27</a:t>
             </a:fld>
             <a:endParaRPr lang="ko-KR" altLang="en-US"/>
           </a:p>
@@ -12000,7 +10575,7 @@
           <a:p>
             <a:fld id="{8ED71C24-08E4-4AF3-BCF3-1A22B934883E}" type="slidenum">
               <a:rPr lang="ko-KR" altLang="en-US" smtClean="0"/>
-              <a:t>14</a:t>
+              <a:t>12</a:t>
             </a:fld>
             <a:endParaRPr lang="ko-KR" altLang="en-US"/>
           </a:p>
@@ -12233,7 +10808,7 @@
           <a:p>
             <a:fld id="{99C85210-9BD9-410B-8B60-1A01FEADF4C9}" type="datetime1">
               <a:rPr lang="ko-KR" altLang="en-US" smtClean="0"/>
-              <a:t>2017-10-23</a:t>
+              <a:t>2017-10-27</a:t>
             </a:fld>
             <a:endParaRPr lang="ko-KR" altLang="en-US"/>
           </a:p>
@@ -12631,7 +11206,7 @@
           <a:p>
             <a:fld id="{80913EDC-9206-426E-951D-E7E0B75694AE}" type="datetime1">
               <a:rPr lang="ko-KR" altLang="en-US" smtClean="0"/>
-              <a:t>2017-10-23</a:t>
+              <a:t>2017-10-27</a:t>
             </a:fld>
             <a:endParaRPr lang="ko-KR" altLang="en-US"/>
           </a:p>
@@ -12736,512 +11311,6 @@
 </file>
 
 <file path=ppt/slides/slide4.xml><?xml version="1.0" encoding="utf-8"?>
-<p:sld xmlns:a="http://schemas.openxmlformats.org/drawingml/2006/main" xmlns:r="http://schemas.openxmlformats.org/officeDocument/2006/relationships" xmlns:p="http://schemas.openxmlformats.org/presentationml/2006/main">
-  <p:cSld>
-    <p:spTree>
-      <p:nvGrpSpPr>
-        <p:cNvPr id="1" name=""/>
-        <p:cNvGrpSpPr/>
-        <p:nvPr/>
-      </p:nvGrpSpPr>
-      <p:grpSpPr>
-        <a:xfrm>
-          <a:off x="0" y="0"/>
-          <a:ext cx="0" cy="0"/>
-          <a:chOff x="0" y="0"/>
-          <a:chExt cx="0" cy="0"/>
-        </a:xfrm>
-      </p:grpSpPr>
-      <p:sp>
-        <p:nvSpPr>
-          <p:cNvPr id="2" name="제목 1"/>
-          <p:cNvSpPr>
-            <a:spLocks noGrp="1"/>
-          </p:cNvSpPr>
-          <p:nvPr>
-            <p:ph type="title"/>
-          </p:nvPr>
-        </p:nvSpPr>
-        <p:spPr/>
-        <p:txBody>
-          <a:bodyPr/>
-          <a:lstStyle/>
-          <a:p>
-            <a:r>
-              <a:rPr lang="ko-KR" altLang="en-US" dirty="0">
-                <a:latin typeface="-윤고딕320" panose="02030504000101010101" pitchFamily="18" charset="-127"/>
-                <a:ea typeface="-윤고딕320" panose="02030504000101010101" pitchFamily="18" charset="-127"/>
-              </a:rPr>
-              <a:t>예시 게임 </a:t>
-            </a:r>
-            <a:r>
-              <a:rPr lang="ko-KR" altLang="en-US" dirty="0" smtClean="0">
-                <a:latin typeface="-윤고딕320" panose="02030504000101010101" pitchFamily="18" charset="-127"/>
-                <a:ea typeface="-윤고딕320" panose="02030504000101010101" pitchFamily="18" charset="-127"/>
-              </a:rPr>
-              <a:t>사진</a:t>
-            </a:r>
-            <a:endParaRPr lang="ko-KR" altLang="en-US" dirty="0">
-              <a:latin typeface="-윤고딕320" panose="02030504000101010101" pitchFamily="18" charset="-127"/>
-              <a:ea typeface="-윤고딕320" panose="02030504000101010101" pitchFamily="18" charset="-127"/>
-            </a:endParaRPr>
-          </a:p>
-        </p:txBody>
-      </p:sp>
-      <p:sp>
-        <p:nvSpPr>
-          <p:cNvPr id="3" name="내용 개체 틀 2"/>
-          <p:cNvSpPr>
-            <a:spLocks noGrp="1"/>
-          </p:cNvSpPr>
-          <p:nvPr>
-            <p:ph idx="1"/>
-          </p:nvPr>
-        </p:nvSpPr>
-        <p:spPr/>
-        <p:txBody>
-          <a:bodyPr>
-            <a:normAutofit/>
-          </a:bodyPr>
-          <a:lstStyle/>
-          <a:p>
-            <a:pPr marL="0" indent="0">
-              <a:buNone/>
-            </a:pPr>
-            <a:r>
-              <a:rPr lang="ko-KR" altLang="en-US" sz="2000" dirty="0" smtClean="0">
-                <a:latin typeface="-윤고딕310" panose="02030504000101010101" pitchFamily="18" charset="-127"/>
-                <a:ea typeface="-윤고딕310" panose="02030504000101010101" pitchFamily="18" charset="-127"/>
-              </a:rPr>
-              <a:t>예시 스크린샷</a:t>
-            </a:r>
-            <a:r>
-              <a:rPr lang="en-US" altLang="ko-KR" sz="2000" dirty="0" smtClean="0">
-                <a:latin typeface="-윤고딕310" panose="02030504000101010101" pitchFamily="18" charset="-127"/>
-                <a:ea typeface="-윤고딕310" panose="02030504000101010101" pitchFamily="18" charset="-127"/>
-              </a:rPr>
-              <a:t>: </a:t>
-            </a:r>
-            <a:r>
-              <a:rPr lang="ko-KR" altLang="en-US" sz="2000" dirty="0" smtClean="0">
-                <a:latin typeface="-윤고딕310" panose="02030504000101010101" pitchFamily="18" charset="-127"/>
-                <a:ea typeface="-윤고딕310" panose="02030504000101010101" pitchFamily="18" charset="-127"/>
-              </a:rPr>
-              <a:t>동굴 이야기 </a:t>
-            </a:r>
-            <a:r>
-              <a:rPr lang="en-US" altLang="ko-KR" sz="2000" dirty="0" smtClean="0">
-                <a:latin typeface="-윤고딕310" panose="02030504000101010101" pitchFamily="18" charset="-127"/>
-                <a:ea typeface="-윤고딕310" panose="02030504000101010101" pitchFamily="18" charset="-127"/>
-              </a:rPr>
-              <a:t>(Cave Story)</a:t>
-            </a:r>
-          </a:p>
-          <a:p>
-            <a:pPr marL="0" indent="0">
-              <a:buNone/>
-            </a:pPr>
-            <a:r>
-              <a:rPr lang="en-US" altLang="ko-KR" sz="2000" dirty="0" smtClean="0">
-                <a:latin typeface="-윤고딕310" panose="02030504000101010101" pitchFamily="18" charset="-127"/>
-                <a:ea typeface="-윤고딕310" panose="02030504000101010101" pitchFamily="18" charset="-127"/>
-              </a:rPr>
-              <a:t> </a:t>
-            </a:r>
-            <a:r>
-              <a:rPr lang="ko-KR" altLang="en-US" sz="2000" dirty="0" smtClean="0">
-                <a:latin typeface="-윤고딕310" panose="02030504000101010101" pitchFamily="18" charset="-127"/>
-                <a:ea typeface="-윤고딕310" panose="02030504000101010101" pitchFamily="18" charset="-127"/>
-              </a:rPr>
-              <a:t>중력이 있는 플랫포머 게임</a:t>
-            </a:r>
-            <a:r>
-              <a:rPr lang="en-US" altLang="ko-KR" sz="2000" dirty="0" smtClean="0">
-                <a:latin typeface="-윤고딕310" panose="02030504000101010101" pitchFamily="18" charset="-127"/>
-                <a:ea typeface="-윤고딕310" panose="02030504000101010101" pitchFamily="18" charset="-127"/>
-              </a:rPr>
-              <a:t>. </a:t>
-            </a:r>
-            <a:r>
-              <a:rPr lang="ko-KR" altLang="en-US" sz="2000" dirty="0" smtClean="0">
-                <a:latin typeface="-윤고딕310" panose="02030504000101010101" pitchFamily="18" charset="-127"/>
-                <a:ea typeface="-윤고딕310" panose="02030504000101010101" pitchFamily="18" charset="-127"/>
-              </a:rPr>
-              <a:t>현실감을 부여하고</a:t>
-            </a:r>
-            <a:r>
-              <a:rPr lang="en-US" altLang="ko-KR" sz="2000" dirty="0" smtClean="0">
-                <a:latin typeface="-윤고딕310" panose="02030504000101010101" pitchFamily="18" charset="-127"/>
-                <a:ea typeface="-윤고딕310" panose="02030504000101010101" pitchFamily="18" charset="-127"/>
-              </a:rPr>
-              <a:t> </a:t>
-            </a:r>
-            <a:r>
-              <a:rPr lang="ko-KR" altLang="en-US" sz="2000" dirty="0" smtClean="0">
-                <a:latin typeface="-윤고딕310" panose="02030504000101010101" pitchFamily="18" charset="-127"/>
-                <a:ea typeface="-윤고딕310" panose="02030504000101010101" pitchFamily="18" charset="-127"/>
-              </a:rPr>
-              <a:t>게임의 </a:t>
-            </a:r>
-            <a:r>
-              <a:rPr lang="ko-KR" altLang="en-US" sz="2000" dirty="0" err="1" smtClean="0">
-                <a:latin typeface="-윤고딕310" panose="02030504000101010101" pitchFamily="18" charset="-127"/>
-                <a:ea typeface="-윤고딕310" panose="02030504000101010101" pitchFamily="18" charset="-127"/>
-              </a:rPr>
-              <a:t>조작감과</a:t>
-            </a:r>
-            <a:r>
-              <a:rPr lang="ko-KR" altLang="en-US" sz="2000" dirty="0" smtClean="0">
-                <a:latin typeface="-윤고딕310" panose="02030504000101010101" pitchFamily="18" charset="-127"/>
-                <a:ea typeface="-윤고딕310" panose="02030504000101010101" pitchFamily="18" charset="-127"/>
-              </a:rPr>
-              <a:t> </a:t>
-            </a:r>
-            <a:r>
-              <a:rPr lang="ko-KR" altLang="en-US" sz="2000" dirty="0" err="1" smtClean="0">
-                <a:latin typeface="-윤고딕310" panose="02030504000101010101" pitchFamily="18" charset="-127"/>
-                <a:ea typeface="-윤고딕310" panose="02030504000101010101" pitchFamily="18" charset="-127"/>
-              </a:rPr>
-              <a:t>게임성을</a:t>
-            </a:r>
-            <a:r>
-              <a:rPr lang="ko-KR" altLang="en-US" sz="2000" dirty="0">
-                <a:latin typeface="-윤고딕310" panose="02030504000101010101" pitchFamily="18" charset="-127"/>
-                <a:ea typeface="-윤고딕310" panose="02030504000101010101" pitchFamily="18" charset="-127"/>
-              </a:rPr>
-              <a:t> </a:t>
-            </a:r>
-            <a:r>
-              <a:rPr lang="ko-KR" altLang="en-US" sz="2000" dirty="0" smtClean="0">
-                <a:latin typeface="-윤고딕310" panose="02030504000101010101" pitchFamily="18" charset="-127"/>
-                <a:ea typeface="-윤고딕310" panose="02030504000101010101" pitchFamily="18" charset="-127"/>
-              </a:rPr>
-              <a:t>상대적으로 쉽게 끌어올릴 수 있다</a:t>
-            </a:r>
-            <a:r>
-              <a:rPr lang="en-US" altLang="ko-KR" sz="2000" dirty="0" smtClean="0">
-                <a:latin typeface="-윤고딕310" panose="02030504000101010101" pitchFamily="18" charset="-127"/>
-                <a:ea typeface="-윤고딕310" panose="02030504000101010101" pitchFamily="18" charset="-127"/>
-              </a:rPr>
-              <a:t>.</a:t>
-            </a:r>
-          </a:p>
-          <a:p>
-            <a:pPr marL="0" indent="0">
-              <a:buNone/>
-            </a:pPr>
-            <a:endParaRPr lang="ko-KR" altLang="en-US" sz="2300" dirty="0">
-              <a:latin typeface="-윤고딕310" panose="02030504000101010101" pitchFamily="18" charset="-127"/>
-              <a:ea typeface="-윤고딕310" panose="02030504000101010101" pitchFamily="18" charset="-127"/>
-            </a:endParaRPr>
-          </a:p>
-        </p:txBody>
-      </p:sp>
-      <p:sp>
-        <p:nvSpPr>
-          <p:cNvPr id="4" name="날짜 개체 틀 3"/>
-          <p:cNvSpPr>
-            <a:spLocks noGrp="1"/>
-          </p:cNvSpPr>
-          <p:nvPr>
-            <p:ph type="dt" sz="half" idx="10"/>
-          </p:nvPr>
-        </p:nvSpPr>
-        <p:spPr>
-          <a:xfrm>
-            <a:off x="6444208" y="5877272"/>
-            <a:ext cx="1213821" cy="365125"/>
-          </a:xfrm>
-        </p:spPr>
-        <p:txBody>
-          <a:bodyPr/>
-          <a:lstStyle/>
-          <a:p>
-            <a:fld id="{1DFADF30-901F-49C8-A3B5-BD350A95808D}" type="datetime1">
-              <a:rPr lang="ko-KR" altLang="en-US" smtClean="0"/>
-              <a:t>2017-10-23</a:t>
-            </a:fld>
-            <a:endParaRPr lang="ko-KR" altLang="en-US"/>
-          </a:p>
-        </p:txBody>
-      </p:sp>
-      <p:sp>
-        <p:nvSpPr>
-          <p:cNvPr id="5" name="슬라이드 번호 개체 틀 4"/>
-          <p:cNvSpPr>
-            <a:spLocks noGrp="1"/>
-          </p:cNvSpPr>
-          <p:nvPr>
-            <p:ph type="sldNum" sz="quarter" idx="12"/>
-          </p:nvPr>
-        </p:nvSpPr>
-        <p:spPr>
-          <a:xfrm>
-            <a:off x="7659822" y="5877272"/>
-            <a:ext cx="554023" cy="365125"/>
-          </a:xfrm>
-        </p:spPr>
-        <p:txBody>
-          <a:bodyPr/>
-          <a:lstStyle/>
-          <a:p>
-            <a:fld id="{8ED71C24-08E4-4AF3-BCF3-1A22B934883E}" type="slidenum">
-              <a:rPr lang="ko-KR" altLang="en-US" smtClean="0"/>
-              <a:t>4</a:t>
-            </a:fld>
-            <a:endParaRPr lang="ko-KR" altLang="en-US"/>
-          </a:p>
-        </p:txBody>
-      </p:sp>
-      <p:sp>
-        <p:nvSpPr>
-          <p:cNvPr id="6" name="바닥글 개체 틀 5"/>
-          <p:cNvSpPr>
-            <a:spLocks noGrp="1"/>
-          </p:cNvSpPr>
-          <p:nvPr>
-            <p:ph type="ftr" sz="quarter" idx="11"/>
-          </p:nvPr>
-        </p:nvSpPr>
-        <p:spPr>
-          <a:xfrm>
-            <a:off x="904021" y="5877272"/>
-            <a:ext cx="5540188" cy="365125"/>
-          </a:xfrm>
-        </p:spPr>
-        <p:txBody>
-          <a:bodyPr/>
-          <a:lstStyle/>
-          <a:p>
-            <a:r>
-              <a:rPr lang="en-US" altLang="ko-KR" smtClean="0">
-                <a:solidFill>
-                  <a:srgbClr val="C00000"/>
-                </a:solidFill>
-                <a:latin typeface="-윤고딕310" panose="02030504000101010101" pitchFamily="18" charset="-127"/>
-                <a:ea typeface="-윤고딕310" panose="02030504000101010101" pitchFamily="18" charset="-127"/>
-              </a:rPr>
-              <a:t>2D </a:t>
-            </a:r>
-            <a:r>
-              <a:rPr lang="ko-KR" altLang="en-US" smtClean="0">
-                <a:solidFill>
-                  <a:srgbClr val="C00000"/>
-                </a:solidFill>
-                <a:latin typeface="-윤고딕310" panose="02030504000101010101" pitchFamily="18" charset="-127"/>
-                <a:ea typeface="-윤고딕310" panose="02030504000101010101" pitchFamily="18" charset="-127"/>
-              </a:rPr>
-              <a:t>게임 프로그래밍</a:t>
-            </a:r>
-            <a:endParaRPr lang="ko-KR" altLang="en-US">
-              <a:solidFill>
-                <a:srgbClr val="C00000"/>
-              </a:solidFill>
-              <a:latin typeface="-윤고딕310" panose="02030504000101010101" pitchFamily="18" charset="-127"/>
-              <a:ea typeface="-윤고딕310" panose="02030504000101010101" pitchFamily="18" charset="-127"/>
-            </a:endParaRPr>
-          </a:p>
-        </p:txBody>
-      </p:sp>
-      <p:pic>
-        <p:nvPicPr>
-          <p:cNvPr id="9" name="그림 8"/>
-          <p:cNvPicPr>
-            <a:picLocks noChangeAspect="1"/>
-          </p:cNvPicPr>
-          <p:nvPr/>
-        </p:nvPicPr>
-        <p:blipFill>
-          <a:blip r:embed="rId2">
-            <a:extLst>
-              <a:ext uri="{28A0092B-C50C-407E-A947-70E740481C1C}">
-                <a14:useLocalDpi xmlns:a14="http://schemas.microsoft.com/office/drawing/2010/main" val="0"/>
-              </a:ext>
-            </a:extLst>
-          </a:blip>
-          <a:stretch>
-            <a:fillRect/>
-          </a:stretch>
-        </p:blipFill>
-        <p:spPr>
-          <a:xfrm>
-            <a:off x="2699792" y="3501008"/>
-            <a:ext cx="3810000" cy="2286000"/>
-          </a:xfrm>
-          <a:prstGeom prst="rect">
-            <a:avLst/>
-          </a:prstGeom>
-        </p:spPr>
-      </p:pic>
-    </p:spTree>
-    <p:extLst>
-      <p:ext uri="{BB962C8B-B14F-4D97-AF65-F5344CB8AC3E}">
-        <p14:creationId xmlns:p14="http://schemas.microsoft.com/office/powerpoint/2010/main" val="1915662292"/>
-      </p:ext>
-    </p:extLst>
-  </p:cSld>
-  <p:clrMapOvr>
-    <a:masterClrMapping/>
-  </p:clrMapOvr>
-  <p:timing>
-    <p:tnLst>
-      <p:par>
-        <p:cTn id="1" dur="indefinite" restart="never" nodeType="tmRoot">
-          <p:childTnLst>
-            <p:seq concurrent="1" nextAc="seek">
-              <p:cTn id="2" dur="indefinite" nodeType="mainSeq">
-                <p:childTnLst>
-                  <p:par>
-                    <p:cTn id="3" fill="hold">
-                      <p:stCondLst>
-                        <p:cond delay="indefinite"/>
-                      </p:stCondLst>
-                      <p:childTnLst>
-                        <p:par>
-                          <p:cTn id="4" fill="hold">
-                            <p:stCondLst>
-                              <p:cond delay="0"/>
-                            </p:stCondLst>
-                            <p:childTnLst>
-                              <p:par>
-                                <p:cTn id="5" presetID="10" presetClass="entr" presetSubtype="0" fill="hold" grpId="0" nodeType="clickEffect">
-                                  <p:stCondLst>
-                                    <p:cond delay="0"/>
-                                  </p:stCondLst>
-                                  <p:childTnLst>
-                                    <p:set>
-                                      <p:cBhvr>
-                                        <p:cTn id="6" dur="1" fill="hold">
-                                          <p:stCondLst>
-                                            <p:cond delay="0"/>
-                                          </p:stCondLst>
-                                        </p:cTn>
-                                        <p:tgtEl>
-                                          <p:spTgt spid="3">
-                                            <p:txEl>
-                                              <p:pRg st="0" end="0"/>
-                                            </p:txEl>
-                                          </p:spTgt>
-                                        </p:tgtEl>
-                                        <p:attrNameLst>
-                                          <p:attrName>style.visibility</p:attrName>
-                                        </p:attrNameLst>
-                                      </p:cBhvr>
-                                      <p:to>
-                                        <p:strVal val="visible"/>
-                                      </p:to>
-                                    </p:set>
-                                    <p:animEffect transition="in" filter="fade">
-                                      <p:cBhvr>
-                                        <p:cTn id="7" dur="500"/>
-                                        <p:tgtEl>
-                                          <p:spTgt spid="3">
-                                            <p:txEl>
-                                              <p:pRg st="0" end="0"/>
-                                            </p:txEl>
-                                          </p:spTgt>
-                                        </p:tgtEl>
-                                      </p:cBhvr>
-                                    </p:animEffect>
-                                  </p:childTnLst>
-                                </p:cTn>
-                              </p:par>
-                            </p:childTnLst>
-                          </p:cTn>
-                        </p:par>
-                      </p:childTnLst>
-                    </p:cTn>
-                  </p:par>
-                  <p:par>
-                    <p:cTn id="8" fill="hold">
-                      <p:stCondLst>
-                        <p:cond delay="indefinite"/>
-                      </p:stCondLst>
-                      <p:childTnLst>
-                        <p:par>
-                          <p:cTn id="9" fill="hold">
-                            <p:stCondLst>
-                              <p:cond delay="0"/>
-                            </p:stCondLst>
-                            <p:childTnLst>
-                              <p:par>
-                                <p:cTn id="10" presetID="10" presetClass="entr" presetSubtype="0" fill="hold" grpId="0" nodeType="clickEffect">
-                                  <p:stCondLst>
-                                    <p:cond delay="0"/>
-                                  </p:stCondLst>
-                                  <p:childTnLst>
-                                    <p:set>
-                                      <p:cBhvr>
-                                        <p:cTn id="11" dur="1" fill="hold">
-                                          <p:stCondLst>
-                                            <p:cond delay="0"/>
-                                          </p:stCondLst>
-                                        </p:cTn>
-                                        <p:tgtEl>
-                                          <p:spTgt spid="3">
-                                            <p:txEl>
-                                              <p:pRg st="1" end="1"/>
-                                            </p:txEl>
-                                          </p:spTgt>
-                                        </p:tgtEl>
-                                        <p:attrNameLst>
-                                          <p:attrName>style.visibility</p:attrName>
-                                        </p:attrNameLst>
-                                      </p:cBhvr>
-                                      <p:to>
-                                        <p:strVal val="visible"/>
-                                      </p:to>
-                                    </p:set>
-                                    <p:animEffect transition="in" filter="fade">
-                                      <p:cBhvr>
-                                        <p:cTn id="12" dur="500"/>
-                                        <p:tgtEl>
-                                          <p:spTgt spid="3">
-                                            <p:txEl>
-                                              <p:pRg st="1" end="1"/>
-                                            </p:txEl>
-                                          </p:spTgt>
-                                        </p:tgtEl>
-                                      </p:cBhvr>
-                                    </p:animEffect>
-                                  </p:childTnLst>
-                                </p:cTn>
-                              </p:par>
-                            </p:childTnLst>
-                          </p:cTn>
-                        </p:par>
-                      </p:childTnLst>
-                    </p:cTn>
-                  </p:par>
-                </p:childTnLst>
-              </p:cTn>
-              <p:prevCondLst>
-                <p:cond evt="onPrev" delay="0">
-                  <p:tgtEl>
-                    <p:sldTgt/>
-                  </p:tgtEl>
-                </p:cond>
-              </p:prevCondLst>
-              <p:nextCondLst>
-                <p:cond evt="onNext" delay="0">
-                  <p:tgtEl>
-                    <p:sldTgt/>
-                  </p:tgtEl>
-                </p:cond>
-              </p:nextCondLst>
-            </p:seq>
-          </p:childTnLst>
-        </p:cTn>
-      </p:par>
-    </p:tnLst>
-    <p:bldLst>
-      <p:bldP spid="3" grpId="0" build="p"/>
-    </p:bldLst>
-  </p:timing>
-</p:sld>
-</file>
-
-<file path=ppt/slides/slide5.xml><?xml version="1.0" encoding="utf-8"?>
 <p:sld xmlns:a="http://schemas.openxmlformats.org/drawingml/2006/main" xmlns:r="http://schemas.openxmlformats.org/officeDocument/2006/relationships" xmlns:p="http://schemas.openxmlformats.org/presentationml/2006/main">
   <p:cSld>
     <p:spTree>
@@ -13373,7 +11442,7 @@
           <a:p>
             <a:fld id="{1DFADF30-901F-49C8-A3B5-BD350A95808D}" type="datetime1">
               <a:rPr lang="ko-KR" altLang="en-US" smtClean="0"/>
-              <a:t>2017-10-23</a:t>
+              <a:t>2017-10-27</a:t>
             </a:fld>
             <a:endParaRPr lang="ko-KR" altLang="en-US"/>
           </a:p>
@@ -13401,7 +11470,7 @@
           <a:p>
             <a:fld id="{8ED71C24-08E4-4AF3-BCF3-1A22B934883E}" type="slidenum">
               <a:rPr lang="ko-KR" altLang="en-US" smtClean="0"/>
-              <a:t>5</a:t>
+              <a:t>4</a:t>
             </a:fld>
             <a:endParaRPr lang="ko-KR" altLang="en-US"/>
           </a:p>
@@ -14669,7 +12738,7 @@
 </p:sld>
 </file>
 
-<file path=ppt/slides/slide6.xml><?xml version="1.0" encoding="utf-8"?>
+<file path=ppt/slides/slide5.xml><?xml version="1.0" encoding="utf-8"?>
 <p:sld xmlns:a="http://schemas.openxmlformats.org/drawingml/2006/main" xmlns:r="http://schemas.openxmlformats.org/officeDocument/2006/relationships" xmlns:p="http://schemas.openxmlformats.org/presentationml/2006/main">
   <p:cSld>
     <p:spTree>
@@ -14801,7 +12870,7 @@
           <a:p>
             <a:fld id="{1DFADF30-901F-49C8-A3B5-BD350A95808D}" type="datetime1">
               <a:rPr lang="ko-KR" altLang="en-US" smtClean="0"/>
-              <a:t>2017-10-23</a:t>
+              <a:t>2017-10-27</a:t>
             </a:fld>
             <a:endParaRPr lang="ko-KR" altLang="en-US"/>
           </a:p>
@@ -14829,7 +12898,7 @@
           <a:p>
             <a:fld id="{8ED71C24-08E4-4AF3-BCF3-1A22B934883E}" type="slidenum">
               <a:rPr lang="ko-KR" altLang="en-US" smtClean="0"/>
-              <a:t>6</a:t>
+              <a:t>5</a:t>
             </a:fld>
             <a:endParaRPr lang="ko-KR" altLang="en-US"/>
           </a:p>
@@ -15993,7 +14062,7 @@
 </p:sld>
 </file>
 
-<file path=ppt/slides/slide7.xml><?xml version="1.0" encoding="utf-8"?>
+<file path=ppt/slides/slide6.xml><?xml version="1.0" encoding="utf-8"?>
 <p:sld xmlns:a="http://schemas.openxmlformats.org/drawingml/2006/main" xmlns:r="http://schemas.openxmlformats.org/officeDocument/2006/relationships" xmlns:p="http://schemas.openxmlformats.org/presentationml/2006/main">
   <p:cSld>
     <p:spTree>
@@ -16082,7 +14151,7 @@
           <a:p>
             <a:fld id="{1DFADF30-901F-49C8-A3B5-BD350A95808D}" type="datetime1">
               <a:rPr lang="ko-KR" altLang="en-US" smtClean="0"/>
-              <a:t>2017-10-23</a:t>
+              <a:t>2017-10-27</a:t>
             </a:fld>
             <a:endParaRPr lang="ko-KR" altLang="en-US"/>
           </a:p>
@@ -16110,7 +14179,7 @@
           <a:p>
             <a:fld id="{8ED71C24-08E4-4AF3-BCF3-1A22B934883E}" type="slidenum">
               <a:rPr lang="ko-KR" altLang="en-US" smtClean="0"/>
-              <a:t>7</a:t>
+              <a:t>6</a:t>
             </a:fld>
             <a:endParaRPr lang="ko-KR" altLang="en-US"/>
           </a:p>
@@ -16657,7 +14726,7 @@
 </p:sld>
 </file>
 
-<file path=ppt/slides/slide8.xml><?xml version="1.0" encoding="utf-8"?>
+<file path=ppt/slides/slide7.xml><?xml version="1.0" encoding="utf-8"?>
 <p:sld xmlns:a="http://schemas.openxmlformats.org/drawingml/2006/main" xmlns:r="http://schemas.openxmlformats.org/officeDocument/2006/relationships" xmlns:p="http://schemas.openxmlformats.org/presentationml/2006/main">
   <p:cSld>
     <p:spTree>
@@ -17673,7 +15742,7 @@
           <a:p>
             <a:fld id="{E63BED42-B56B-487C-A576-F8E55AE26EFB}" type="datetime1">
               <a:rPr lang="ko-KR" altLang="en-US" smtClean="0"/>
-              <a:t>2017-10-23</a:t>
+              <a:t>2017-10-27</a:t>
             </a:fld>
             <a:endParaRPr lang="ko-KR" altLang="en-US"/>
           </a:p>
@@ -17701,7 +15770,7 @@
           <a:p>
             <a:fld id="{8ED71C24-08E4-4AF3-BCF3-1A22B934883E}" type="slidenum">
               <a:rPr lang="ko-KR" altLang="en-US" smtClean="0"/>
-              <a:t>8</a:t>
+              <a:t>7</a:t>
             </a:fld>
             <a:endParaRPr lang="ko-KR" altLang="en-US"/>
           </a:p>
@@ -17777,7 +15846,7 @@
 </p:sld>
 </file>
 
-<file path=ppt/slides/slide9.xml><?xml version="1.0" encoding="utf-8"?>
+<file path=ppt/slides/slide8.xml><?xml version="1.0" encoding="utf-8"?>
 <p:sld xmlns:a="http://schemas.openxmlformats.org/drawingml/2006/main" xmlns:r="http://schemas.openxmlformats.org/officeDocument/2006/relationships" xmlns:p="http://schemas.openxmlformats.org/presentationml/2006/main">
   <p:cSld>
     <p:spTree>
@@ -18581,7 +16650,7 @@
           <a:p>
             <a:fld id="{E63BED42-B56B-487C-A576-F8E55AE26EFB}" type="datetime1">
               <a:rPr lang="ko-KR" altLang="en-US" smtClean="0"/>
-              <a:t>2017-10-23</a:t>
+              <a:t>2017-10-27</a:t>
             </a:fld>
             <a:endParaRPr lang="ko-KR" altLang="en-US"/>
           </a:p>
@@ -18609,7 +16678,7 @@
           <a:p>
             <a:fld id="{8ED71C24-08E4-4AF3-BCF3-1A22B934883E}" type="slidenum">
               <a:rPr lang="ko-KR" altLang="en-US" smtClean="0"/>
-              <a:t>9</a:t>
+              <a:t>8</a:t>
             </a:fld>
             <a:endParaRPr lang="ko-KR" altLang="en-US"/>
           </a:p>
@@ -18669,6 +16738,1201 @@
     <p:extLst>
       <p:ext uri="{BB962C8B-B14F-4D97-AF65-F5344CB8AC3E}">
         <p14:creationId xmlns:p14="http://schemas.microsoft.com/office/powerpoint/2010/main" val="4020163945"/>
+      </p:ext>
+    </p:extLst>
+  </p:cSld>
+  <p:clrMapOvr>
+    <a:masterClrMapping/>
+  </p:clrMapOvr>
+  <p:timing>
+    <p:tnLst>
+      <p:par>
+        <p:cTn id="1" dur="indefinite" restart="never" nodeType="tmRoot"/>
+      </p:par>
+    </p:tnLst>
+  </p:timing>
+</p:sld>
+</file>
+
+<file path=ppt/slides/slide9.xml><?xml version="1.0" encoding="utf-8"?>
+<p:sld xmlns:a="http://schemas.openxmlformats.org/drawingml/2006/main" xmlns:r="http://schemas.openxmlformats.org/officeDocument/2006/relationships" xmlns:p="http://schemas.openxmlformats.org/presentationml/2006/main">
+  <p:cSld>
+    <p:spTree>
+      <p:nvGrpSpPr>
+        <p:cNvPr id="1" name=""/>
+        <p:cNvGrpSpPr/>
+        <p:nvPr/>
+      </p:nvGrpSpPr>
+      <p:grpSpPr>
+        <a:xfrm>
+          <a:off x="0" y="0"/>
+          <a:ext cx="0" cy="0"/>
+          <a:chOff x="0" y="0"/>
+          <a:chExt cx="0" cy="0"/>
+        </a:xfrm>
+      </p:grpSpPr>
+      <p:sp>
+        <p:nvSpPr>
+          <p:cNvPr id="2" name="제목 1"/>
+          <p:cNvSpPr>
+            <a:spLocks noGrp="1"/>
+          </p:cNvSpPr>
+          <p:nvPr>
+            <p:ph type="title"/>
+          </p:nvPr>
+        </p:nvSpPr>
+        <p:spPr>
+          <a:xfrm>
+            <a:off x="1115616" y="980728"/>
+            <a:ext cx="6965245" cy="1202485"/>
+          </a:xfrm>
+        </p:spPr>
+        <p:txBody>
+          <a:bodyPr anchor="t"/>
+          <a:lstStyle/>
+          <a:p>
+            <a:r>
+              <a:rPr lang="ko-KR" altLang="en-US" dirty="0" smtClean="0">
+                <a:latin typeface="-윤고딕320" panose="02030504000101010101" pitchFamily="18" charset="-127"/>
+                <a:ea typeface="-윤고딕320" panose="02030504000101010101" pitchFamily="18" charset="-127"/>
+              </a:rPr>
+              <a:t>개발 일정 </a:t>
+            </a:r>
+            <a:r>
+              <a:rPr lang="en-US" altLang="ko-KR" dirty="0" smtClean="0">
+                <a:latin typeface="-윤고딕320" panose="02030504000101010101" pitchFamily="18" charset="-127"/>
+                <a:ea typeface="-윤고딕320" panose="02030504000101010101" pitchFamily="18" charset="-127"/>
+              </a:rPr>
+              <a:t>(1)</a:t>
+            </a:r>
+            <a:endParaRPr lang="ko-KR" altLang="en-US" dirty="0">
+              <a:latin typeface="-윤고딕320" panose="02030504000101010101" pitchFamily="18" charset="-127"/>
+              <a:ea typeface="-윤고딕320" panose="02030504000101010101" pitchFamily="18" charset="-127"/>
+            </a:endParaRPr>
+          </a:p>
+        </p:txBody>
+      </p:sp>
+      <p:graphicFrame>
+        <p:nvGraphicFramePr>
+          <p:cNvPr id="7" name="내용 개체 틀 6"/>
+          <p:cNvGraphicFramePr>
+            <a:graphicFrameLocks noGrp="1"/>
+          </p:cNvGraphicFramePr>
+          <p:nvPr>
+            <p:ph idx="1"/>
+            <p:extLst>
+              <p:ext uri="{D42A27DB-BD31-4B8C-83A1-F6EECF244321}">
+                <p14:modId xmlns:p14="http://schemas.microsoft.com/office/powerpoint/2010/main" val="1302906887"/>
+              </p:ext>
+            </p:extLst>
+          </p:nvPr>
+        </p:nvGraphicFramePr>
+        <p:xfrm>
+          <a:off x="827584" y="1844818"/>
+          <a:ext cx="7488832" cy="4008675"/>
+        </p:xfrm>
+        <a:graphic>
+          <a:graphicData uri="http://schemas.openxmlformats.org/drawingml/2006/table">
+            <a:tbl>
+              <a:tblPr firstRow="1" bandRow="1">
+                <a:effectLst>
+                  <a:innerShdw blurRad="228600">
+                    <a:prstClr val="black">
+                      <a:alpha val="98000"/>
+                    </a:prstClr>
+                  </a:innerShdw>
+                </a:effectLst>
+                <a:tableStyleId>{5C22544A-7EE6-4342-B048-85BDC9FD1C3A}</a:tableStyleId>
+              </a:tblPr>
+              <a:tblGrid>
+                <a:gridCol w="706347"/>
+                <a:gridCol w="1695233"/>
+                <a:gridCol w="5087252"/>
+              </a:tblGrid>
+              <a:tr h="442817">
+                <a:tc>
+                  <a:txBody>
+                    <a:bodyPr/>
+                    <a:lstStyle/>
+                    <a:p>
+                      <a:pPr algn="ctr" latinLnBrk="1"/>
+                      <a:r>
+                        <a:rPr lang="ko-KR" altLang="en-US" sz="2000" b="0" dirty="0" smtClean="0">
+                          <a:latin typeface="-윤고딕320" panose="02030504000101010101" pitchFamily="18" charset="-127"/>
+                          <a:ea typeface="-윤고딕320" panose="02030504000101010101" pitchFamily="18" charset="-127"/>
+                        </a:rPr>
+                        <a:t>주차</a:t>
+                      </a:r>
+                      <a:endParaRPr lang="ko-KR" altLang="en-US" sz="2000" b="0" dirty="0">
+                        <a:latin typeface="-윤고딕320" panose="02030504000101010101" pitchFamily="18" charset="-127"/>
+                        <a:ea typeface="-윤고딕320" panose="02030504000101010101" pitchFamily="18" charset="-127"/>
+                      </a:endParaRPr>
+                    </a:p>
+                  </a:txBody>
+                  <a:tcPr marL="111605" marR="111605" marT="55802" marB="55802" anchor="ctr">
+                    <a:solidFill>
+                      <a:schemeClr val="accent1">
+                        <a:tint val="40000"/>
+                        <a:alpha val="35000"/>
+                      </a:schemeClr>
+                    </a:solidFill>
+                  </a:tcPr>
+                </a:tc>
+                <a:tc>
+                  <a:txBody>
+                    <a:bodyPr/>
+                    <a:lstStyle/>
+                    <a:p>
+                      <a:pPr algn="ctr" latinLnBrk="1"/>
+                      <a:r>
+                        <a:rPr lang="ko-KR" altLang="en-US" sz="2000" b="0" dirty="0" smtClean="0">
+                          <a:latin typeface="-윤고딕320" panose="02030504000101010101" pitchFamily="18" charset="-127"/>
+                          <a:ea typeface="-윤고딕320" panose="02030504000101010101" pitchFamily="18" charset="-127"/>
+                        </a:rPr>
+                        <a:t>주제</a:t>
+                      </a:r>
+                      <a:endParaRPr lang="ko-KR" altLang="en-US" sz="2000" b="0" dirty="0">
+                        <a:latin typeface="-윤고딕320" panose="02030504000101010101" pitchFamily="18" charset="-127"/>
+                        <a:ea typeface="-윤고딕320" panose="02030504000101010101" pitchFamily="18" charset="-127"/>
+                      </a:endParaRPr>
+                    </a:p>
+                  </a:txBody>
+                  <a:tcPr marL="111605" marR="111605" marT="55802" marB="55802" anchor="ctr"/>
+                </a:tc>
+                <a:tc>
+                  <a:txBody>
+                    <a:bodyPr/>
+                    <a:lstStyle/>
+                    <a:p>
+                      <a:pPr algn="ctr" latinLnBrk="1"/>
+                      <a:r>
+                        <a:rPr lang="ko-KR" altLang="en-US" sz="2000" b="0" dirty="0" smtClean="0">
+                          <a:latin typeface="-윤고딕320" panose="02030504000101010101" pitchFamily="18" charset="-127"/>
+                          <a:ea typeface="-윤고딕320" panose="02030504000101010101" pitchFamily="18" charset="-127"/>
+                        </a:rPr>
+                        <a:t>상세</a:t>
+                      </a:r>
+                      <a:endParaRPr lang="ko-KR" altLang="en-US" sz="2000" b="0" dirty="0">
+                        <a:latin typeface="-윤고딕320" panose="02030504000101010101" pitchFamily="18" charset="-127"/>
+                        <a:ea typeface="-윤고딕320" panose="02030504000101010101" pitchFamily="18" charset="-127"/>
+                      </a:endParaRPr>
+                    </a:p>
+                  </a:txBody>
+                  <a:tcPr marL="111605" marR="111605" marT="55802" marB="55802" anchor="ctr"/>
+                </a:tc>
+              </a:tr>
+              <a:tr h="1165274">
+                <a:tc>
+                  <a:txBody>
+                    <a:bodyPr/>
+                    <a:lstStyle/>
+                    <a:p>
+                      <a:pPr algn="ctr" latinLnBrk="1"/>
+                      <a:r>
+                        <a:rPr lang="en-US" altLang="ko-KR" sz="1900" dirty="0" smtClean="0">
+                          <a:latin typeface="-윤고딕310" panose="02030504000101010101" pitchFamily="18" charset="-127"/>
+                          <a:ea typeface="-윤고딕310" panose="02030504000101010101" pitchFamily="18" charset="-127"/>
+                        </a:rPr>
+                        <a:t>1</a:t>
+                      </a:r>
+                      <a:endParaRPr lang="ko-KR" altLang="en-US" sz="1900" dirty="0">
+                        <a:latin typeface="-윤고딕310" panose="02030504000101010101" pitchFamily="18" charset="-127"/>
+                        <a:ea typeface="-윤고딕310" panose="02030504000101010101" pitchFamily="18" charset="-127"/>
+                      </a:endParaRPr>
+                    </a:p>
+                  </a:txBody>
+                  <a:tcPr marL="111605" marR="111605" marT="55802" marB="55802" anchor="ctr">
+                    <a:solidFill>
+                      <a:schemeClr val="accent1">
+                        <a:tint val="40000"/>
+                        <a:alpha val="35000"/>
+                      </a:schemeClr>
+                    </a:solidFill>
+                  </a:tcPr>
+                </a:tc>
+                <a:tc>
+                  <a:txBody>
+                    <a:bodyPr/>
+                    <a:lstStyle/>
+                    <a:p>
+                      <a:pPr marL="0" indent="0" algn="ctr" latinLnBrk="1">
+                        <a:buFont typeface="Arial" panose="020B0604020202020204" pitchFamily="34" charset="0"/>
+                        <a:buNone/>
+                      </a:pPr>
+                      <a:r>
+                        <a:rPr lang="ko-KR" altLang="en-US" sz="1200" dirty="0" smtClean="0">
+                          <a:latin typeface="-윤고딕310" panose="02030504000101010101" pitchFamily="18" charset="-127"/>
+                          <a:ea typeface="-윤고딕310" panose="02030504000101010101" pitchFamily="18" charset="-127"/>
+                        </a:rPr>
+                        <a:t>기본적 메커니즘</a:t>
+                      </a:r>
+                      <a:endParaRPr lang="en-US" altLang="ko-KR" sz="1200" dirty="0" smtClean="0">
+                        <a:latin typeface="-윤고딕310" panose="02030504000101010101" pitchFamily="18" charset="-127"/>
+                        <a:ea typeface="-윤고딕310" panose="02030504000101010101" pitchFamily="18" charset="-127"/>
+                      </a:endParaRPr>
+                    </a:p>
+                    <a:p>
+                      <a:pPr marL="0" indent="0" algn="ctr" latinLnBrk="1">
+                        <a:buFont typeface="Arial" panose="020B0604020202020204" pitchFamily="34" charset="0"/>
+                        <a:buNone/>
+                      </a:pPr>
+                      <a:r>
+                        <a:rPr lang="ko-KR" altLang="en-US" sz="1200" dirty="0" smtClean="0">
+                          <a:latin typeface="-윤고딕310" panose="02030504000101010101" pitchFamily="18" charset="-127"/>
+                          <a:ea typeface="-윤고딕310" panose="02030504000101010101" pitchFamily="18" charset="-127"/>
+                        </a:rPr>
+                        <a:t>지형과 중력</a:t>
+                      </a:r>
+                      <a:endParaRPr lang="ko-KR" altLang="en-US" sz="1200" dirty="0">
+                        <a:latin typeface="-윤고딕310" panose="02030504000101010101" pitchFamily="18" charset="-127"/>
+                        <a:ea typeface="-윤고딕310" panose="02030504000101010101" pitchFamily="18" charset="-127"/>
+                      </a:endParaRPr>
+                    </a:p>
+                  </a:txBody>
+                  <a:tcPr marL="111605" marR="111605" marT="55802" marB="55802" anchor="ctr"/>
+                </a:tc>
+                <a:tc>
+                  <a:txBody>
+                    <a:bodyPr/>
+                    <a:lstStyle/>
+                    <a:p>
+                      <a:pPr marL="171450" indent="-171450" latinLnBrk="1">
+                        <a:buFont typeface="Arial" panose="020B0604020202020204" pitchFamily="34" charset="0"/>
+                        <a:buChar char="•"/>
+                      </a:pPr>
+                      <a:r>
+                        <a:rPr lang="ko-KR" altLang="en-US" sz="1200" dirty="0" smtClean="0">
+                          <a:latin typeface="-윤고딕310" panose="02030504000101010101" pitchFamily="18" charset="-127"/>
+                          <a:ea typeface="-윤고딕310" panose="02030504000101010101" pitchFamily="18" charset="-127"/>
+                        </a:rPr>
+                        <a:t>필요한 객체를 모두 정의하고 상속 관계를 분명히 한다</a:t>
+                      </a:r>
+                      <a:r>
+                        <a:rPr lang="en-US" altLang="ko-KR" sz="1200" dirty="0" smtClean="0">
+                          <a:latin typeface="-윤고딕310" panose="02030504000101010101" pitchFamily="18" charset="-127"/>
+                          <a:ea typeface="-윤고딕310" panose="02030504000101010101" pitchFamily="18" charset="-127"/>
+                        </a:rPr>
+                        <a:t>.  </a:t>
+                      </a:r>
+                      <a:r>
+                        <a:rPr lang="ko-KR" altLang="en-US" sz="1200" dirty="0" smtClean="0">
+                          <a:latin typeface="-윤고딕310" panose="02030504000101010101" pitchFamily="18" charset="-127"/>
+                          <a:ea typeface="-윤고딕310" panose="02030504000101010101" pitchFamily="18" charset="-127"/>
+                        </a:rPr>
+                        <a:t>모든 객체들은 하나의 중력 객체를 상속한다</a:t>
+                      </a:r>
+                      <a:r>
+                        <a:rPr lang="en-US" altLang="ko-KR" sz="1200" dirty="0" smtClean="0">
+                          <a:latin typeface="-윤고딕310" panose="02030504000101010101" pitchFamily="18" charset="-127"/>
+                          <a:ea typeface="-윤고딕310" panose="02030504000101010101" pitchFamily="18" charset="-127"/>
+                        </a:rPr>
+                        <a:t>.</a:t>
+                      </a:r>
+                      <a:r>
+                        <a:rPr lang="en-US" altLang="ko-KR" sz="1200" baseline="0" dirty="0" smtClean="0">
+                          <a:latin typeface="-윤고딕310" panose="02030504000101010101" pitchFamily="18" charset="-127"/>
+                          <a:ea typeface="-윤고딕310" panose="02030504000101010101" pitchFamily="18" charset="-127"/>
+                        </a:rPr>
+                        <a:t> </a:t>
+                      </a:r>
+                      <a:r>
+                        <a:rPr lang="ko-KR" altLang="en-US" sz="1200" baseline="0" dirty="0" smtClean="0">
+                          <a:latin typeface="-윤고딕310" panose="02030504000101010101" pitchFamily="18" charset="-127"/>
+                          <a:ea typeface="-윤고딕310" panose="02030504000101010101" pitchFamily="18" charset="-127"/>
+                        </a:rPr>
+                        <a:t>메소드들 역시 규격화된 이름으로 정리한다</a:t>
+                      </a:r>
+                      <a:r>
+                        <a:rPr lang="en-US" altLang="ko-KR" sz="1200" baseline="0" dirty="0" smtClean="0">
+                          <a:latin typeface="-윤고딕310" panose="02030504000101010101" pitchFamily="18" charset="-127"/>
+                          <a:ea typeface="-윤고딕310" panose="02030504000101010101" pitchFamily="18" charset="-127"/>
+                        </a:rPr>
+                        <a:t>.</a:t>
+                      </a:r>
+                    </a:p>
+                    <a:p>
+                      <a:pPr marL="171450" marR="0" indent="-171450" algn="l" defTabSz="914400" rtl="0" eaLnBrk="1" fontAlgn="auto" latinLnBrk="1" hangingPunct="1">
+                        <a:lnSpc>
+                          <a:spcPct val="100000"/>
+                        </a:lnSpc>
+                        <a:spcBef>
+                          <a:spcPts val="0"/>
+                        </a:spcBef>
+                        <a:spcAft>
+                          <a:spcPts val="0"/>
+                        </a:spcAft>
+                        <a:buClrTx/>
+                        <a:buSzTx/>
+                        <a:buFont typeface="Arial" panose="020B0604020202020204" pitchFamily="34" charset="0"/>
+                        <a:buChar char="•"/>
+                        <a:tabLst/>
+                        <a:defRPr/>
+                      </a:pPr>
+                      <a:r>
+                        <a:rPr lang="ko-KR" altLang="en-US" sz="1200" dirty="0" smtClean="0">
+                          <a:latin typeface="-윤고딕310" panose="02030504000101010101" pitchFamily="18" charset="-127"/>
+                          <a:ea typeface="-윤고딕310" panose="02030504000101010101" pitchFamily="18" charset="-127"/>
+                        </a:rPr>
+                        <a:t>지형 객체의 특수화를 한다</a:t>
+                      </a:r>
+                      <a:r>
+                        <a:rPr lang="en-US" altLang="ko-KR" sz="1200" dirty="0" smtClean="0">
+                          <a:latin typeface="-윤고딕310" panose="02030504000101010101" pitchFamily="18" charset="-127"/>
+                          <a:ea typeface="-윤고딕310" panose="02030504000101010101" pitchFamily="18" charset="-127"/>
+                        </a:rPr>
+                        <a:t>.</a:t>
+                      </a:r>
+                      <a:r>
+                        <a:rPr lang="ko-KR" altLang="en-US" sz="1200" dirty="0" smtClean="0">
+                          <a:latin typeface="-윤고딕310" panose="02030504000101010101" pitchFamily="18" charset="-127"/>
+                          <a:ea typeface="-윤고딕310" panose="02030504000101010101" pitchFamily="18" charset="-127"/>
+                        </a:rPr>
+                        <a:t> 중력 객체</a:t>
+                      </a:r>
+                      <a:r>
+                        <a:rPr lang="en-US" altLang="ko-KR" sz="1200" dirty="0" smtClean="0">
+                          <a:latin typeface="-윤고딕310" panose="02030504000101010101" pitchFamily="18" charset="-127"/>
+                          <a:ea typeface="-윤고딕310" panose="02030504000101010101" pitchFamily="18" charset="-127"/>
+                        </a:rPr>
+                        <a:t>-&gt;</a:t>
+                      </a:r>
+                      <a:r>
+                        <a:rPr lang="ko-KR" altLang="en-US" sz="1200" dirty="0" smtClean="0">
+                          <a:latin typeface="-윤고딕310" panose="02030504000101010101" pitchFamily="18" charset="-127"/>
+                          <a:ea typeface="-윤고딕310" panose="02030504000101010101" pitchFamily="18" charset="-127"/>
+                        </a:rPr>
+                        <a:t>블록</a:t>
+                      </a:r>
+                      <a:r>
+                        <a:rPr lang="en-US" altLang="ko-KR" sz="1200" dirty="0" smtClean="0">
+                          <a:latin typeface="-윤고딕310" panose="02030504000101010101" pitchFamily="18" charset="-127"/>
+                          <a:ea typeface="-윤고딕310" panose="02030504000101010101" pitchFamily="18" charset="-127"/>
+                        </a:rPr>
+                        <a:t>-&gt;</a:t>
+                      </a:r>
+                      <a:r>
+                        <a:rPr lang="ko-KR" altLang="en-US" sz="1200" dirty="0" smtClean="0">
+                          <a:latin typeface="-윤고딕310" panose="02030504000101010101" pitchFamily="18" charset="-127"/>
+                          <a:ea typeface="-윤고딕310" panose="02030504000101010101" pitchFamily="18" charset="-127"/>
+                        </a:rPr>
+                        <a:t>나무</a:t>
+                      </a:r>
+                      <a:r>
+                        <a:rPr lang="en-US" altLang="ko-KR" sz="1200" dirty="0" smtClean="0">
+                          <a:latin typeface="-윤고딕310" panose="02030504000101010101" pitchFamily="18" charset="-127"/>
+                          <a:ea typeface="-윤고딕310" panose="02030504000101010101" pitchFamily="18" charset="-127"/>
+                        </a:rPr>
+                        <a:t>, </a:t>
+                      </a:r>
+                      <a:r>
+                        <a:rPr lang="ko-KR" altLang="en-US" sz="1200" dirty="0" smtClean="0">
+                          <a:latin typeface="-윤고딕310" panose="02030504000101010101" pitchFamily="18" charset="-127"/>
+                          <a:ea typeface="-윤고딕310" panose="02030504000101010101" pitchFamily="18" charset="-127"/>
+                        </a:rPr>
+                        <a:t>벽돌</a:t>
+                      </a:r>
+                      <a:r>
+                        <a:rPr lang="en-US" altLang="ko-KR" sz="1200" dirty="0" smtClean="0">
+                          <a:latin typeface="-윤고딕310" panose="02030504000101010101" pitchFamily="18" charset="-127"/>
+                          <a:ea typeface="-윤고딕310" panose="02030504000101010101" pitchFamily="18" charset="-127"/>
+                        </a:rPr>
+                        <a:t>, </a:t>
+                      </a:r>
+                      <a:r>
+                        <a:rPr lang="ko-KR" altLang="en-US" sz="1200" dirty="0" smtClean="0">
+                          <a:latin typeface="-윤고딕310" panose="02030504000101010101" pitchFamily="18" charset="-127"/>
+                          <a:ea typeface="-윤고딕310" panose="02030504000101010101" pitchFamily="18" charset="-127"/>
+                        </a:rPr>
+                        <a:t>땅</a:t>
+                      </a:r>
+                      <a:r>
+                        <a:rPr lang="en-US" altLang="ko-KR" sz="1200" dirty="0" smtClean="0">
+                          <a:latin typeface="-윤고딕310" panose="02030504000101010101" pitchFamily="18" charset="-127"/>
+                          <a:ea typeface="-윤고딕310" panose="02030504000101010101" pitchFamily="18" charset="-127"/>
+                        </a:rPr>
+                        <a:t>, …</a:t>
+                      </a:r>
+                    </a:p>
+                    <a:p>
+                      <a:pPr marL="171450" marR="0" indent="-171450" algn="l" defTabSz="914400" rtl="0" eaLnBrk="1" fontAlgn="auto" latinLnBrk="1" hangingPunct="1">
+                        <a:lnSpc>
+                          <a:spcPct val="100000"/>
+                        </a:lnSpc>
+                        <a:spcBef>
+                          <a:spcPts val="0"/>
+                        </a:spcBef>
+                        <a:spcAft>
+                          <a:spcPts val="0"/>
+                        </a:spcAft>
+                        <a:buClrTx/>
+                        <a:buSzTx/>
+                        <a:buFont typeface="Arial" panose="020B0604020202020204" pitchFamily="34" charset="0"/>
+                        <a:buChar char="•"/>
+                        <a:tabLst/>
+                        <a:defRPr/>
+                      </a:pPr>
+                      <a:r>
+                        <a:rPr lang="ko-KR" altLang="en-US" sz="1200" dirty="0" smtClean="0">
+                          <a:latin typeface="-윤고딕310" panose="02030504000101010101" pitchFamily="18" charset="-127"/>
+                          <a:ea typeface="-윤고딕310" panose="02030504000101010101" pitchFamily="18" charset="-127"/>
+                        </a:rPr>
+                        <a:t>모든 개체는 중력이 작동한다</a:t>
+                      </a:r>
+                      <a:r>
+                        <a:rPr lang="en-US" altLang="ko-KR" sz="1200" dirty="0" smtClean="0">
+                          <a:latin typeface="-윤고딕310" panose="02030504000101010101" pitchFamily="18" charset="-127"/>
+                          <a:ea typeface="-윤고딕310" panose="02030504000101010101" pitchFamily="18" charset="-127"/>
+                        </a:rPr>
+                        <a:t>. </a:t>
+                      </a:r>
+                      <a:r>
+                        <a:rPr lang="ko-KR" altLang="en-US" sz="1200" dirty="0" smtClean="0">
+                          <a:latin typeface="-윤고딕310" panose="02030504000101010101" pitchFamily="18" charset="-127"/>
+                          <a:ea typeface="-윤고딕310" panose="02030504000101010101" pitchFamily="18" charset="-127"/>
+                        </a:rPr>
+                        <a:t>충돌 처리를 위해 개체 리스트가 들어있는 이름으로 구분된 사전에서 반복문을 돌려서 처리한다</a:t>
+                      </a:r>
+                      <a:endParaRPr lang="ko-KR" altLang="en-US" sz="1200" dirty="0">
+                        <a:latin typeface="-윤고딕310" panose="02030504000101010101" pitchFamily="18" charset="-127"/>
+                        <a:ea typeface="-윤고딕310" panose="02030504000101010101" pitchFamily="18" charset="-127"/>
+                      </a:endParaRPr>
+                    </a:p>
+                  </a:txBody>
+                  <a:tcPr marL="111605" marR="111605" marT="55802" marB="55802"/>
+                </a:tc>
+              </a:tr>
+              <a:tr h="702124">
+                <a:tc>
+                  <a:txBody>
+                    <a:bodyPr/>
+                    <a:lstStyle/>
+                    <a:p>
+                      <a:pPr algn="ctr" latinLnBrk="1"/>
+                      <a:r>
+                        <a:rPr lang="en-US" altLang="ko-KR" sz="1900" dirty="0" smtClean="0">
+                          <a:latin typeface="-윤고딕310" panose="02030504000101010101" pitchFamily="18" charset="-127"/>
+                          <a:ea typeface="-윤고딕310" panose="02030504000101010101" pitchFamily="18" charset="-127"/>
+                        </a:rPr>
+                        <a:t>2</a:t>
+                      </a:r>
+                      <a:endParaRPr lang="ko-KR" altLang="en-US" sz="1900" dirty="0">
+                        <a:latin typeface="-윤고딕310" panose="02030504000101010101" pitchFamily="18" charset="-127"/>
+                        <a:ea typeface="-윤고딕310" panose="02030504000101010101" pitchFamily="18" charset="-127"/>
+                      </a:endParaRPr>
+                    </a:p>
+                  </a:txBody>
+                  <a:tcPr marL="111605" marR="111605" marT="55802" marB="55802" anchor="ctr">
+                    <a:solidFill>
+                      <a:schemeClr val="accent1">
+                        <a:tint val="40000"/>
+                        <a:alpha val="35000"/>
+                      </a:schemeClr>
+                    </a:solidFill>
+                  </a:tcPr>
+                </a:tc>
+                <a:tc>
+                  <a:txBody>
+                    <a:bodyPr/>
+                    <a:lstStyle/>
+                    <a:p>
+                      <a:pPr marL="0" indent="0" algn="ctr" latinLnBrk="1">
+                        <a:buFont typeface="Arial" panose="020B0604020202020204" pitchFamily="34" charset="0"/>
+                        <a:buNone/>
+                      </a:pPr>
+                      <a:r>
+                        <a:rPr lang="ko-KR" altLang="en-US" sz="1200" dirty="0" smtClean="0">
+                          <a:latin typeface="-윤고딕310" panose="02030504000101010101" pitchFamily="18" charset="-127"/>
+                          <a:ea typeface="-윤고딕310" panose="02030504000101010101" pitchFamily="18" charset="-127"/>
+                        </a:rPr>
+                        <a:t>리소스 수집과 테스트</a:t>
+                      </a:r>
+                      <a:endParaRPr lang="ko-KR" altLang="en-US" sz="1200" dirty="0">
+                        <a:latin typeface="-윤고딕310" panose="02030504000101010101" pitchFamily="18" charset="-127"/>
+                        <a:ea typeface="-윤고딕310" panose="02030504000101010101" pitchFamily="18" charset="-127"/>
+                      </a:endParaRPr>
+                    </a:p>
+                  </a:txBody>
+                  <a:tcPr marL="111605" marR="111605" marT="55802" marB="55802" anchor="ctr"/>
+                </a:tc>
+                <a:tc>
+                  <a:txBody>
+                    <a:bodyPr/>
+                    <a:lstStyle/>
+                    <a:p>
+                      <a:pPr marL="171450" marR="0" indent="-171450" algn="l" defTabSz="914400" rtl="0" eaLnBrk="1" fontAlgn="auto" latinLnBrk="1" hangingPunct="1">
+                        <a:lnSpc>
+                          <a:spcPct val="100000"/>
+                        </a:lnSpc>
+                        <a:spcBef>
+                          <a:spcPts val="0"/>
+                        </a:spcBef>
+                        <a:spcAft>
+                          <a:spcPts val="0"/>
+                        </a:spcAft>
+                        <a:buClrTx/>
+                        <a:buSzTx/>
+                        <a:buFont typeface="Arial" panose="020B0604020202020204" pitchFamily="34" charset="0"/>
+                        <a:buChar char="•"/>
+                        <a:tabLst/>
+                        <a:defRPr/>
+                      </a:pPr>
+                      <a:r>
+                        <a:rPr lang="ko-KR" altLang="en-US" sz="1200" dirty="0" smtClean="0">
+                          <a:latin typeface="-윤고딕310" panose="02030504000101010101" pitchFamily="18" charset="-127"/>
+                          <a:ea typeface="-윤고딕310" panose="02030504000101010101" pitchFamily="18" charset="-127"/>
+                        </a:rPr>
+                        <a:t>필요한 리소스를 구하고 객체들에 적용한다</a:t>
+                      </a:r>
+                      <a:r>
+                        <a:rPr lang="en-US" altLang="ko-KR" sz="1200" dirty="0" smtClean="0">
+                          <a:latin typeface="-윤고딕310" panose="02030504000101010101" pitchFamily="18" charset="-127"/>
+                          <a:ea typeface="-윤고딕310" panose="02030504000101010101" pitchFamily="18" charset="-127"/>
+                        </a:rPr>
+                        <a:t>. </a:t>
+                      </a:r>
+                      <a:r>
+                        <a:rPr lang="ko-KR" altLang="en-US" sz="1200" dirty="0" smtClean="0">
+                          <a:latin typeface="-윤고딕310" panose="02030504000101010101" pitchFamily="18" charset="-127"/>
+                          <a:ea typeface="-윤고딕310" panose="02030504000101010101" pitchFamily="18" charset="-127"/>
+                        </a:rPr>
+                        <a:t>중력을 영향을 받는 객체들이 이미지와 잘 맞는지 테스트한다</a:t>
+                      </a:r>
+                      <a:r>
+                        <a:rPr lang="en-US" altLang="ko-KR" sz="1200" dirty="0" smtClean="0">
+                          <a:latin typeface="-윤고딕310" panose="02030504000101010101" pitchFamily="18" charset="-127"/>
+                          <a:ea typeface="-윤고딕310" panose="02030504000101010101" pitchFamily="18" charset="-127"/>
+                        </a:rPr>
+                        <a:t>. </a:t>
+                      </a:r>
+                      <a:r>
+                        <a:rPr lang="ko-KR" altLang="en-US" sz="1200" dirty="0" smtClean="0">
+                          <a:latin typeface="-윤고딕310" panose="02030504000101010101" pitchFamily="18" charset="-127"/>
+                          <a:ea typeface="-윤고딕310" panose="02030504000101010101" pitchFamily="18" charset="-127"/>
+                        </a:rPr>
+                        <a:t>객체들을 배치하여 실제로 어울리는지</a:t>
+                      </a:r>
+                      <a:r>
+                        <a:rPr lang="en-US" altLang="ko-KR" sz="1200" dirty="0" smtClean="0">
+                          <a:latin typeface="-윤고딕310" panose="02030504000101010101" pitchFamily="18" charset="-127"/>
+                          <a:ea typeface="-윤고딕310" panose="02030504000101010101" pitchFamily="18" charset="-127"/>
+                        </a:rPr>
+                        <a:t>,</a:t>
+                      </a:r>
+                      <a:r>
+                        <a:rPr lang="ko-KR" altLang="en-US" sz="1200" dirty="0" smtClean="0">
+                          <a:latin typeface="-윤고딕310" panose="02030504000101010101" pitchFamily="18" charset="-127"/>
+                          <a:ea typeface="-윤고딕310" panose="02030504000101010101" pitchFamily="18" charset="-127"/>
+                        </a:rPr>
+                        <a:t> 그리고 중력</a:t>
+                      </a:r>
+                      <a:r>
+                        <a:rPr lang="en-US" altLang="ko-KR" sz="1200" dirty="0" smtClean="0">
+                          <a:latin typeface="-윤고딕310" panose="02030504000101010101" pitchFamily="18" charset="-127"/>
+                          <a:ea typeface="-윤고딕310" panose="02030504000101010101" pitchFamily="18" charset="-127"/>
+                        </a:rPr>
+                        <a:t>, </a:t>
+                      </a:r>
+                      <a:r>
+                        <a:rPr lang="ko-KR" altLang="en-US" sz="1200" dirty="0" smtClean="0">
+                          <a:latin typeface="-윤고딕310" panose="02030504000101010101" pitchFamily="18" charset="-127"/>
+                          <a:ea typeface="-윤고딕310" panose="02030504000101010101" pitchFamily="18" charset="-127"/>
+                        </a:rPr>
+                        <a:t>충돌과 속도가 작동하는지 확인한다</a:t>
+                      </a:r>
+                      <a:r>
+                        <a:rPr lang="en-US" altLang="ko-KR" sz="1200" dirty="0" smtClean="0">
+                          <a:latin typeface="-윤고딕310" panose="02030504000101010101" pitchFamily="18" charset="-127"/>
+                          <a:ea typeface="-윤고딕310" panose="02030504000101010101" pitchFamily="18" charset="-127"/>
+                        </a:rPr>
+                        <a:t>.</a:t>
+                      </a:r>
+                      <a:endParaRPr lang="ko-KR" altLang="en-US" sz="1200" dirty="0" smtClean="0">
+                        <a:latin typeface="-윤고딕310" panose="02030504000101010101" pitchFamily="18" charset="-127"/>
+                        <a:ea typeface="-윤고딕310" panose="02030504000101010101" pitchFamily="18" charset="-127"/>
+                      </a:endParaRPr>
+                    </a:p>
+                  </a:txBody>
+                  <a:tcPr marL="111605" marR="111605" marT="55802" marB="55802"/>
+                </a:tc>
+              </a:tr>
+              <a:tr h="519108">
+                <a:tc>
+                  <a:txBody>
+                    <a:bodyPr/>
+                    <a:lstStyle/>
+                    <a:p>
+                      <a:pPr algn="ctr" latinLnBrk="1"/>
+                      <a:r>
+                        <a:rPr lang="en-US" altLang="ko-KR" sz="1900" dirty="0" smtClean="0">
+                          <a:latin typeface="-윤고딕310" panose="02030504000101010101" pitchFamily="18" charset="-127"/>
+                          <a:ea typeface="-윤고딕310" panose="02030504000101010101" pitchFamily="18" charset="-127"/>
+                        </a:rPr>
+                        <a:t>3</a:t>
+                      </a:r>
+                      <a:endParaRPr lang="ko-KR" altLang="en-US" sz="1900" dirty="0">
+                        <a:latin typeface="-윤고딕310" panose="02030504000101010101" pitchFamily="18" charset="-127"/>
+                        <a:ea typeface="-윤고딕310" panose="02030504000101010101" pitchFamily="18" charset="-127"/>
+                      </a:endParaRPr>
+                    </a:p>
+                  </a:txBody>
+                  <a:tcPr marL="111605" marR="111605" marT="55802" marB="55802" anchor="ctr">
+                    <a:solidFill>
+                      <a:schemeClr val="accent1">
+                        <a:tint val="40000"/>
+                        <a:alpha val="35000"/>
+                      </a:schemeClr>
+                    </a:solidFill>
+                  </a:tcPr>
+                </a:tc>
+                <a:tc>
+                  <a:txBody>
+                    <a:bodyPr/>
+                    <a:lstStyle/>
+                    <a:p>
+                      <a:pPr marL="0" indent="0" algn="ctr" latinLnBrk="1">
+                        <a:buFont typeface="Arial" panose="020B0604020202020204" pitchFamily="34" charset="0"/>
+                        <a:buNone/>
+                      </a:pPr>
+                      <a:r>
+                        <a:rPr lang="ko-KR" altLang="en-US" sz="1200" dirty="0" smtClean="0">
+                          <a:latin typeface="-윤고딕310" panose="02030504000101010101" pitchFamily="18" charset="-127"/>
+                          <a:ea typeface="-윤고딕310" panose="02030504000101010101" pitchFamily="18" charset="-127"/>
+                        </a:rPr>
+                        <a:t>플레이어</a:t>
+                      </a:r>
+                      <a:r>
+                        <a:rPr lang="en-US" altLang="ko-KR" sz="1200" baseline="0" dirty="0" smtClean="0">
+                          <a:latin typeface="-윤고딕310" panose="02030504000101010101" pitchFamily="18" charset="-127"/>
+                          <a:ea typeface="-윤고딕310" panose="02030504000101010101" pitchFamily="18" charset="-127"/>
+                        </a:rPr>
+                        <a:t> </a:t>
+                      </a:r>
+                      <a:r>
+                        <a:rPr lang="ko-KR" altLang="en-US" sz="1200" baseline="0" dirty="0" smtClean="0">
+                          <a:latin typeface="-윤고딕310" panose="02030504000101010101" pitchFamily="18" charset="-127"/>
+                          <a:ea typeface="-윤고딕310" panose="02030504000101010101" pitchFamily="18" charset="-127"/>
+                        </a:rPr>
+                        <a:t>객체</a:t>
+                      </a:r>
+                      <a:endParaRPr lang="ko-KR" altLang="en-US" sz="1200" dirty="0">
+                        <a:latin typeface="-윤고딕310" panose="02030504000101010101" pitchFamily="18" charset="-127"/>
+                        <a:ea typeface="-윤고딕310" panose="02030504000101010101" pitchFamily="18" charset="-127"/>
+                      </a:endParaRPr>
+                    </a:p>
+                  </a:txBody>
+                  <a:tcPr marL="111605" marR="111605" marT="55802" marB="55802" anchor="ctr"/>
+                </a:tc>
+                <a:tc>
+                  <a:txBody>
+                    <a:bodyPr/>
+                    <a:lstStyle/>
+                    <a:p>
+                      <a:pPr marL="171450" indent="-171450" latinLnBrk="1">
+                        <a:buFont typeface="Arial" panose="020B0604020202020204" pitchFamily="34" charset="0"/>
+                        <a:buChar char="•"/>
+                      </a:pPr>
+                      <a:r>
+                        <a:rPr lang="ko-KR" altLang="en-US" sz="1200" dirty="0" smtClean="0">
+                          <a:latin typeface="-윤고딕310" panose="02030504000101010101" pitchFamily="18" charset="-127"/>
+                          <a:ea typeface="-윤고딕310" panose="02030504000101010101" pitchFamily="18" charset="-127"/>
+                        </a:rPr>
+                        <a:t>플레이어는 키 입력 이벤트를 받아 움직인다</a:t>
+                      </a:r>
+                      <a:r>
+                        <a:rPr lang="en-US" altLang="ko-KR" sz="1200" dirty="0" smtClean="0">
+                          <a:latin typeface="-윤고딕310" panose="02030504000101010101" pitchFamily="18" charset="-127"/>
+                          <a:ea typeface="-윤고딕310" panose="02030504000101010101" pitchFamily="18" charset="-127"/>
+                        </a:rPr>
+                        <a:t>. </a:t>
+                      </a:r>
+                      <a:r>
+                        <a:rPr lang="ko-KR" altLang="en-US" sz="1200" dirty="0" smtClean="0">
+                          <a:latin typeface="-윤고딕310" panose="02030504000101010101" pitchFamily="18" charset="-127"/>
+                          <a:ea typeface="-윤고딕310" panose="02030504000101010101" pitchFamily="18" charset="-127"/>
+                        </a:rPr>
+                        <a:t>누른 키에 따라 행동을 취하는데 처음엔 움직임만 취하도록 한다</a:t>
+                      </a:r>
+                      <a:r>
+                        <a:rPr lang="en-US" altLang="ko-KR" sz="1200" dirty="0" smtClean="0">
+                          <a:latin typeface="-윤고딕310" panose="02030504000101010101" pitchFamily="18" charset="-127"/>
+                          <a:ea typeface="-윤고딕310" panose="02030504000101010101" pitchFamily="18" charset="-127"/>
+                        </a:rPr>
+                        <a:t>.</a:t>
+                      </a:r>
+                      <a:endParaRPr lang="ko-KR" altLang="en-US" sz="1200" dirty="0">
+                        <a:latin typeface="-윤고딕310" panose="02030504000101010101" pitchFamily="18" charset="-127"/>
+                        <a:ea typeface="-윤고딕310" panose="02030504000101010101" pitchFamily="18" charset="-127"/>
+                      </a:endParaRPr>
+                    </a:p>
+                  </a:txBody>
+                  <a:tcPr marL="111605" marR="111605" marT="55802" marB="55802"/>
+                </a:tc>
+              </a:tr>
+              <a:tr h="519108">
+                <a:tc>
+                  <a:txBody>
+                    <a:bodyPr/>
+                    <a:lstStyle/>
+                    <a:p>
+                      <a:pPr algn="ctr" latinLnBrk="1"/>
+                      <a:r>
+                        <a:rPr lang="en-US" altLang="ko-KR" sz="1900" dirty="0" smtClean="0">
+                          <a:latin typeface="-윤고딕310" panose="02030504000101010101" pitchFamily="18" charset="-127"/>
+                          <a:ea typeface="-윤고딕310" panose="02030504000101010101" pitchFamily="18" charset="-127"/>
+                        </a:rPr>
+                        <a:t>4</a:t>
+                      </a:r>
+                      <a:endParaRPr lang="ko-KR" altLang="en-US" sz="1900" dirty="0">
+                        <a:latin typeface="-윤고딕310" panose="02030504000101010101" pitchFamily="18" charset="-127"/>
+                        <a:ea typeface="-윤고딕310" panose="02030504000101010101" pitchFamily="18" charset="-127"/>
+                      </a:endParaRPr>
+                    </a:p>
+                  </a:txBody>
+                  <a:tcPr marL="111605" marR="111605" marT="55802" marB="55802" anchor="ctr">
+                    <a:solidFill>
+                      <a:schemeClr val="accent1">
+                        <a:tint val="40000"/>
+                        <a:alpha val="35000"/>
+                      </a:schemeClr>
+                    </a:solidFill>
+                  </a:tcPr>
+                </a:tc>
+                <a:tc>
+                  <a:txBody>
+                    <a:bodyPr/>
+                    <a:lstStyle/>
+                    <a:p>
+                      <a:pPr marL="0" indent="0" algn="ctr" latinLnBrk="1">
+                        <a:buFont typeface="Arial" panose="020B0604020202020204" pitchFamily="34" charset="0"/>
+                        <a:buNone/>
+                      </a:pPr>
+                      <a:r>
+                        <a:rPr lang="en-US" altLang="ko-KR" sz="1200" dirty="0" smtClean="0">
+                          <a:latin typeface="-윤고딕310" panose="02030504000101010101" pitchFamily="18" charset="-127"/>
+                          <a:ea typeface="-윤고딕310" panose="02030504000101010101" pitchFamily="18" charset="-127"/>
+                        </a:rPr>
+                        <a:t>NPC</a:t>
+                      </a:r>
+                      <a:r>
+                        <a:rPr lang="en-US" altLang="ko-KR" sz="1200" baseline="0" dirty="0" smtClean="0">
+                          <a:latin typeface="-윤고딕310" panose="02030504000101010101" pitchFamily="18" charset="-127"/>
+                          <a:ea typeface="-윤고딕310" panose="02030504000101010101" pitchFamily="18" charset="-127"/>
+                        </a:rPr>
+                        <a:t> </a:t>
+                      </a:r>
+                      <a:r>
+                        <a:rPr lang="ko-KR" altLang="en-US" sz="1200" baseline="0" dirty="0" smtClean="0">
+                          <a:latin typeface="-윤고딕310" panose="02030504000101010101" pitchFamily="18" charset="-127"/>
+                          <a:ea typeface="-윤고딕310" panose="02030504000101010101" pitchFamily="18" charset="-127"/>
+                        </a:rPr>
+                        <a:t>객체와 인공지능</a:t>
+                      </a:r>
+                      <a:endParaRPr lang="ko-KR" altLang="en-US" sz="1200" dirty="0">
+                        <a:latin typeface="-윤고딕310" panose="02030504000101010101" pitchFamily="18" charset="-127"/>
+                        <a:ea typeface="-윤고딕310" panose="02030504000101010101" pitchFamily="18" charset="-127"/>
+                      </a:endParaRPr>
+                    </a:p>
+                  </a:txBody>
+                  <a:tcPr marL="111605" marR="111605" marT="55802" marB="55802" anchor="ctr"/>
+                </a:tc>
+                <a:tc>
+                  <a:txBody>
+                    <a:bodyPr/>
+                    <a:lstStyle/>
+                    <a:p>
+                      <a:pPr marL="171450" marR="0" indent="-171450" algn="l" defTabSz="914400" rtl="0" eaLnBrk="1" fontAlgn="auto" latinLnBrk="1" hangingPunct="1">
+                        <a:lnSpc>
+                          <a:spcPct val="100000"/>
+                        </a:lnSpc>
+                        <a:spcBef>
+                          <a:spcPts val="0"/>
+                        </a:spcBef>
+                        <a:spcAft>
+                          <a:spcPts val="0"/>
+                        </a:spcAft>
+                        <a:buClrTx/>
+                        <a:buSzTx/>
+                        <a:buFont typeface="Arial" panose="020B0604020202020204" pitchFamily="34" charset="0"/>
+                        <a:buChar char="•"/>
+                        <a:tabLst/>
+                        <a:defRPr/>
+                      </a:pPr>
+                      <a:r>
+                        <a:rPr lang="ko-KR" altLang="en-US" sz="1200" dirty="0" smtClean="0">
+                          <a:latin typeface="-윤고딕310" panose="02030504000101010101" pitchFamily="18" charset="-127"/>
+                          <a:ea typeface="-윤고딕310" panose="02030504000101010101" pitchFamily="18" charset="-127"/>
+                        </a:rPr>
+                        <a:t>적들은 시야가 있으며 플레이어를 발견하면 다가와 공격한다</a:t>
+                      </a:r>
+                      <a:r>
+                        <a:rPr lang="en-US" altLang="ko-KR" sz="1200" dirty="0" smtClean="0">
+                          <a:latin typeface="-윤고딕310" panose="02030504000101010101" pitchFamily="18" charset="-127"/>
+                          <a:ea typeface="-윤고딕310" panose="02030504000101010101" pitchFamily="18" charset="-127"/>
+                        </a:rPr>
+                        <a:t>. </a:t>
+                      </a:r>
+                      <a:r>
+                        <a:rPr lang="ko-KR" altLang="en-US" sz="1200" dirty="0" smtClean="0">
+                          <a:latin typeface="-윤고딕310" panose="02030504000101010101" pitchFamily="18" charset="-127"/>
+                          <a:ea typeface="-윤고딕310" panose="02030504000101010101" pitchFamily="18" charset="-127"/>
+                        </a:rPr>
+                        <a:t>적들은 대체로 단순하지만 일부 적은 까다로운 </a:t>
+                      </a:r>
+                      <a:r>
+                        <a:rPr lang="en-US" altLang="ko-KR" sz="1200" dirty="0" smtClean="0">
+                          <a:latin typeface="-윤고딕310" panose="02030504000101010101" pitchFamily="18" charset="-127"/>
+                          <a:ea typeface="-윤고딕310" panose="02030504000101010101" pitchFamily="18" charset="-127"/>
+                        </a:rPr>
+                        <a:t>(</a:t>
+                      </a:r>
+                      <a:r>
+                        <a:rPr lang="ko-KR" altLang="en-US" sz="1200" dirty="0" smtClean="0">
+                          <a:latin typeface="-윤고딕310" panose="02030504000101010101" pitchFamily="18" charset="-127"/>
+                          <a:ea typeface="-윤고딕310" panose="02030504000101010101" pitchFamily="18" charset="-127"/>
+                        </a:rPr>
+                        <a:t>하지만 반복적인</a:t>
+                      </a:r>
+                      <a:r>
+                        <a:rPr lang="en-US" altLang="ko-KR" sz="1200" dirty="0" smtClean="0">
+                          <a:latin typeface="-윤고딕310" panose="02030504000101010101" pitchFamily="18" charset="-127"/>
+                          <a:ea typeface="-윤고딕310" panose="02030504000101010101" pitchFamily="18" charset="-127"/>
+                        </a:rPr>
+                        <a:t>) </a:t>
+                      </a:r>
+                      <a:r>
+                        <a:rPr lang="ko-KR" altLang="en-US" sz="1200" dirty="0" smtClean="0">
+                          <a:latin typeface="-윤고딕310" panose="02030504000101010101" pitchFamily="18" charset="-127"/>
+                          <a:ea typeface="-윤고딕310" panose="02030504000101010101" pitchFamily="18" charset="-127"/>
+                        </a:rPr>
+                        <a:t>행동을 한다</a:t>
+                      </a:r>
+                      <a:r>
+                        <a:rPr lang="en-US" altLang="ko-KR" sz="1200" dirty="0" smtClean="0">
+                          <a:latin typeface="-윤고딕310" panose="02030504000101010101" pitchFamily="18" charset="-127"/>
+                          <a:ea typeface="-윤고딕310" panose="02030504000101010101" pitchFamily="18" charset="-127"/>
+                        </a:rPr>
+                        <a:t>.</a:t>
+                      </a:r>
+                      <a:endParaRPr lang="ko-KR" altLang="en-US" sz="1200" dirty="0" smtClean="0">
+                        <a:latin typeface="-윤고딕310" panose="02030504000101010101" pitchFamily="18" charset="-127"/>
+                        <a:ea typeface="-윤고딕310" panose="02030504000101010101" pitchFamily="18" charset="-127"/>
+                      </a:endParaRPr>
+                    </a:p>
+                  </a:txBody>
+                  <a:tcPr marL="111605" marR="111605" marT="55802" marB="55802"/>
+                </a:tc>
+              </a:tr>
+              <a:tr h="540006">
+                <a:tc>
+                  <a:txBody>
+                    <a:bodyPr/>
+                    <a:lstStyle/>
+                    <a:p>
+                      <a:pPr algn="ctr" latinLnBrk="1"/>
+                      <a:r>
+                        <a:rPr lang="en-US" altLang="ko-KR" sz="1900" dirty="0" smtClean="0">
+                          <a:latin typeface="-윤고딕310" panose="02030504000101010101" pitchFamily="18" charset="-127"/>
+                          <a:ea typeface="-윤고딕310" panose="02030504000101010101" pitchFamily="18" charset="-127"/>
+                        </a:rPr>
+                        <a:t>5</a:t>
+                      </a:r>
+                      <a:endParaRPr lang="ko-KR" altLang="en-US" sz="1900" dirty="0">
+                        <a:latin typeface="-윤고딕310" panose="02030504000101010101" pitchFamily="18" charset="-127"/>
+                        <a:ea typeface="-윤고딕310" panose="02030504000101010101" pitchFamily="18" charset="-127"/>
+                      </a:endParaRPr>
+                    </a:p>
+                  </a:txBody>
+                  <a:tcPr marL="111605" marR="111605" marT="55802" marB="55802" anchor="ctr">
+                    <a:solidFill>
+                      <a:schemeClr val="accent1">
+                        <a:tint val="40000"/>
+                        <a:alpha val="35000"/>
+                      </a:schemeClr>
+                    </a:solidFill>
+                  </a:tcPr>
+                </a:tc>
+                <a:tc>
+                  <a:txBody>
+                    <a:bodyPr/>
+                    <a:lstStyle/>
+                    <a:p>
+                      <a:pPr marL="0" indent="0" algn="ctr" latinLnBrk="1">
+                        <a:buFont typeface="Arial" panose="020B0604020202020204" pitchFamily="34" charset="0"/>
+                        <a:buNone/>
+                      </a:pPr>
+                      <a:r>
+                        <a:rPr lang="ko-KR" altLang="en-US" sz="1200" dirty="0" smtClean="0">
+                          <a:latin typeface="-윤고딕310" panose="02030504000101010101" pitchFamily="18" charset="-127"/>
+                          <a:ea typeface="-윤고딕310" panose="02030504000101010101" pitchFamily="18" charset="-127"/>
+                        </a:rPr>
+                        <a:t>객체 상호 작용 </a:t>
+                      </a:r>
+                      <a:r>
+                        <a:rPr lang="en-US" altLang="ko-KR" sz="1200" dirty="0" smtClean="0">
+                          <a:latin typeface="-윤고딕310" panose="02030504000101010101" pitchFamily="18" charset="-127"/>
+                          <a:ea typeface="-윤고딕310" panose="02030504000101010101" pitchFamily="18" charset="-127"/>
+                        </a:rPr>
+                        <a:t>1</a:t>
+                      </a:r>
+                      <a:endParaRPr lang="ko-KR" altLang="en-US" sz="1200" dirty="0">
+                        <a:latin typeface="-윤고딕310" panose="02030504000101010101" pitchFamily="18" charset="-127"/>
+                        <a:ea typeface="-윤고딕310" panose="02030504000101010101" pitchFamily="18" charset="-127"/>
+                      </a:endParaRPr>
+                    </a:p>
+                  </a:txBody>
+                  <a:tcPr marL="111605" marR="111605" marT="55802" marB="55802" anchor="ctr">
+                    <a:solidFill>
+                      <a:srgbClr val="FFF0E8"/>
+                    </a:solidFill>
+                  </a:tcPr>
+                </a:tc>
+                <a:tc>
+                  <a:txBody>
+                    <a:bodyPr/>
+                    <a:lstStyle/>
+                    <a:p>
+                      <a:pPr marL="171450" indent="-171450" latinLnBrk="1">
+                        <a:buFont typeface="Arial" panose="020B0604020202020204" pitchFamily="34" charset="0"/>
+                        <a:buChar char="•"/>
+                      </a:pPr>
+                      <a:r>
+                        <a:rPr lang="ko-KR" altLang="en-US" sz="1200" dirty="0" smtClean="0">
+                          <a:latin typeface="-윤고딕310" panose="02030504000101010101" pitchFamily="18" charset="-127"/>
+                          <a:ea typeface="-윤고딕310" panose="02030504000101010101" pitchFamily="18" charset="-127"/>
+                        </a:rPr>
+                        <a:t>플레이어와 </a:t>
+                      </a:r>
+                      <a:r>
+                        <a:rPr lang="en-US" altLang="ko-KR" sz="1200" dirty="0" smtClean="0">
+                          <a:latin typeface="-윤고딕310" panose="02030504000101010101" pitchFamily="18" charset="-127"/>
+                          <a:ea typeface="-윤고딕310" panose="02030504000101010101" pitchFamily="18" charset="-127"/>
+                        </a:rPr>
+                        <a:t>NPC, NPC </a:t>
+                      </a:r>
+                      <a:r>
+                        <a:rPr lang="ko-KR" altLang="en-US" sz="1200" dirty="0" smtClean="0">
+                          <a:latin typeface="-윤고딕310" panose="02030504000101010101" pitchFamily="18" charset="-127"/>
+                          <a:ea typeface="-윤고딕310" panose="02030504000101010101" pitchFamily="18" charset="-127"/>
+                        </a:rPr>
+                        <a:t>와 </a:t>
+                      </a:r>
+                      <a:r>
+                        <a:rPr lang="en-US" altLang="ko-KR" sz="1200" dirty="0" smtClean="0">
+                          <a:latin typeface="-윤고딕310" panose="02030504000101010101" pitchFamily="18" charset="-127"/>
+                          <a:ea typeface="-윤고딕310" panose="02030504000101010101" pitchFamily="18" charset="-127"/>
+                        </a:rPr>
+                        <a:t>NPC </a:t>
+                      </a:r>
+                      <a:r>
+                        <a:rPr lang="ko-KR" altLang="en-US" sz="1200" dirty="0" smtClean="0">
+                          <a:latin typeface="-윤고딕310" panose="02030504000101010101" pitchFamily="18" charset="-127"/>
+                          <a:ea typeface="-윤고딕310" panose="02030504000101010101" pitchFamily="18" charset="-127"/>
+                        </a:rPr>
+                        <a:t>등등 객체들끼리의 상호 작용을</a:t>
+                      </a:r>
+                      <a:r>
+                        <a:rPr lang="ko-KR" altLang="en-US" sz="1200" baseline="0" dirty="0" smtClean="0">
+                          <a:latin typeface="-윤고딕310" panose="02030504000101010101" pitchFamily="18" charset="-127"/>
+                          <a:ea typeface="-윤고딕310" panose="02030504000101010101" pitchFamily="18" charset="-127"/>
+                        </a:rPr>
+                        <a:t> 구현한다</a:t>
+                      </a:r>
+                      <a:r>
+                        <a:rPr lang="en-US" altLang="ko-KR" sz="1200" baseline="0" dirty="0" smtClean="0">
+                          <a:latin typeface="-윤고딕310" panose="02030504000101010101" pitchFamily="18" charset="-127"/>
+                          <a:ea typeface="-윤고딕310" panose="02030504000101010101" pitchFamily="18" charset="-127"/>
+                        </a:rPr>
+                        <a:t>. </a:t>
+                      </a:r>
+                      <a:r>
+                        <a:rPr lang="ko-KR" altLang="en-US" sz="1200" baseline="0" dirty="0" smtClean="0">
+                          <a:latin typeface="-윤고딕310" panose="02030504000101010101" pitchFamily="18" charset="-127"/>
+                          <a:ea typeface="-윤고딕310" panose="02030504000101010101" pitchFamily="18" charset="-127"/>
+                        </a:rPr>
+                        <a:t>피격</a:t>
+                      </a:r>
+                      <a:r>
+                        <a:rPr lang="en-US" altLang="ko-KR" sz="1200" baseline="0" dirty="0" smtClean="0">
+                          <a:latin typeface="-윤고딕310" panose="02030504000101010101" pitchFamily="18" charset="-127"/>
+                          <a:ea typeface="-윤고딕310" panose="02030504000101010101" pitchFamily="18" charset="-127"/>
+                        </a:rPr>
+                        <a:t>, </a:t>
+                      </a:r>
+                      <a:r>
+                        <a:rPr lang="ko-KR" altLang="en-US" sz="1200" baseline="0" dirty="0" smtClean="0">
+                          <a:latin typeface="-윤고딕310" panose="02030504000101010101" pitchFamily="18" charset="-127"/>
+                          <a:ea typeface="-윤고딕310" panose="02030504000101010101" pitchFamily="18" charset="-127"/>
+                        </a:rPr>
+                        <a:t>공격</a:t>
+                      </a:r>
+                      <a:r>
+                        <a:rPr lang="en-US" altLang="ko-KR" sz="1200" baseline="0" dirty="0" smtClean="0">
+                          <a:latin typeface="-윤고딕310" panose="02030504000101010101" pitchFamily="18" charset="-127"/>
+                          <a:ea typeface="-윤고딕310" panose="02030504000101010101" pitchFamily="18" charset="-127"/>
+                        </a:rPr>
+                        <a:t>, </a:t>
+                      </a:r>
+                      <a:r>
+                        <a:rPr lang="ko-KR" altLang="en-US" sz="1200" baseline="0" dirty="0" smtClean="0">
+                          <a:latin typeface="-윤고딕310" panose="02030504000101010101" pitchFamily="18" charset="-127"/>
+                          <a:ea typeface="-윤고딕310" panose="02030504000101010101" pitchFamily="18" charset="-127"/>
+                        </a:rPr>
+                        <a:t>사망</a:t>
+                      </a:r>
+                      <a:r>
+                        <a:rPr lang="en-US" altLang="ko-KR" sz="1200" baseline="0" dirty="0" smtClean="0">
+                          <a:latin typeface="-윤고딕310" panose="02030504000101010101" pitchFamily="18" charset="-127"/>
+                          <a:ea typeface="-윤고딕310" panose="02030504000101010101" pitchFamily="18" charset="-127"/>
+                        </a:rPr>
+                        <a:t>, </a:t>
+                      </a:r>
+                      <a:r>
+                        <a:rPr lang="ko-KR" altLang="en-US" sz="1200" baseline="0" dirty="0" smtClean="0">
+                          <a:latin typeface="-윤고딕310" panose="02030504000101010101" pitchFamily="18" charset="-127"/>
+                          <a:ea typeface="-윤고딕310" panose="02030504000101010101" pitchFamily="18" charset="-127"/>
+                        </a:rPr>
+                        <a:t>등의 상호작용은 충돌할 때 일어난다</a:t>
+                      </a:r>
+                      <a:r>
+                        <a:rPr lang="en-US" altLang="ko-KR" sz="1200" baseline="0" dirty="0" smtClean="0">
+                          <a:latin typeface="-윤고딕310" panose="02030504000101010101" pitchFamily="18" charset="-127"/>
+                          <a:ea typeface="-윤고딕310" panose="02030504000101010101" pitchFamily="18" charset="-127"/>
+                        </a:rPr>
+                        <a:t>.</a:t>
+                      </a:r>
+                    </a:p>
+                    <a:p>
+                      <a:pPr marL="171450" indent="-171450" latinLnBrk="1">
+                        <a:buFont typeface="Arial" panose="020B0604020202020204" pitchFamily="34" charset="0"/>
+                        <a:buChar char="•"/>
+                      </a:pPr>
+                      <a:endParaRPr lang="ko-KR" altLang="en-US" sz="1200" dirty="0">
+                        <a:latin typeface="-윤고딕310" panose="02030504000101010101" pitchFamily="18" charset="-127"/>
+                        <a:ea typeface="-윤고딕310" panose="02030504000101010101" pitchFamily="18" charset="-127"/>
+                      </a:endParaRPr>
+                    </a:p>
+                  </a:txBody>
+                  <a:tcPr marL="111605" marR="111605" marT="55802" marB="55802">
+                    <a:solidFill>
+                      <a:srgbClr val="FFF0E8"/>
+                    </a:solidFill>
+                  </a:tcPr>
+                </a:tc>
+              </a:tr>
+            </a:tbl>
+          </a:graphicData>
+        </a:graphic>
+      </p:graphicFrame>
+      <p:sp>
+        <p:nvSpPr>
+          <p:cNvPr id="4" name="날짜 개체 틀 3"/>
+          <p:cNvSpPr>
+            <a:spLocks noGrp="1"/>
+          </p:cNvSpPr>
+          <p:nvPr>
+            <p:ph type="dt" sz="half" idx="10"/>
+          </p:nvPr>
+        </p:nvSpPr>
+        <p:spPr>
+          <a:xfrm>
+            <a:off x="6452730" y="5877272"/>
+            <a:ext cx="1213821" cy="365125"/>
+          </a:xfrm>
+        </p:spPr>
+        <p:txBody>
+          <a:bodyPr/>
+          <a:lstStyle/>
+          <a:p>
+            <a:fld id="{E63BED42-B56B-487C-A576-F8E55AE26EFB}" type="datetime1">
+              <a:rPr lang="ko-KR" altLang="en-US" smtClean="0"/>
+              <a:t>2017-10-27</a:t>
+            </a:fld>
+            <a:endParaRPr lang="ko-KR" altLang="en-US"/>
+          </a:p>
+        </p:txBody>
+      </p:sp>
+      <p:sp>
+        <p:nvSpPr>
+          <p:cNvPr id="5" name="슬라이드 번호 개체 틀 4"/>
+          <p:cNvSpPr>
+            <a:spLocks noGrp="1"/>
+          </p:cNvSpPr>
+          <p:nvPr>
+            <p:ph type="sldNum" sz="quarter" idx="12"/>
+          </p:nvPr>
+        </p:nvSpPr>
+        <p:spPr>
+          <a:xfrm>
+            <a:off x="7668344" y="5877272"/>
+            <a:ext cx="554023" cy="365125"/>
+          </a:xfrm>
+        </p:spPr>
+        <p:txBody>
+          <a:bodyPr/>
+          <a:lstStyle/>
+          <a:p>
+            <a:fld id="{8ED71C24-08E4-4AF3-BCF3-1A22B934883E}" type="slidenum">
+              <a:rPr lang="ko-KR" altLang="en-US" smtClean="0"/>
+              <a:t>9</a:t>
+            </a:fld>
+            <a:endParaRPr lang="ko-KR" altLang="en-US"/>
+          </a:p>
+        </p:txBody>
+      </p:sp>
+      <p:sp>
+        <p:nvSpPr>
+          <p:cNvPr id="6" name="바닥글 개체 틀 5"/>
+          <p:cNvSpPr>
+            <a:spLocks noGrp="1"/>
+          </p:cNvSpPr>
+          <p:nvPr>
+            <p:ph type="ftr" sz="quarter" idx="11"/>
+          </p:nvPr>
+        </p:nvSpPr>
+        <p:spPr>
+          <a:xfrm>
+            <a:off x="912543" y="5877272"/>
+            <a:ext cx="5540188" cy="365125"/>
+          </a:xfrm>
+        </p:spPr>
+        <p:txBody>
+          <a:bodyPr/>
+          <a:lstStyle/>
+          <a:p>
+            <a:r>
+              <a:rPr lang="en-US" altLang="ko-KR" dirty="0" smtClean="0">
+                <a:solidFill>
+                  <a:srgbClr val="C00000"/>
+                </a:solidFill>
+                <a:latin typeface="-윤고딕310" panose="02030504000101010101" pitchFamily="18" charset="-127"/>
+                <a:ea typeface="-윤고딕310" panose="02030504000101010101" pitchFamily="18" charset="-127"/>
+              </a:rPr>
+              <a:t>2D </a:t>
+            </a:r>
+            <a:r>
+              <a:rPr lang="ko-KR" altLang="en-US" dirty="0" smtClean="0">
+                <a:solidFill>
+                  <a:srgbClr val="C00000"/>
+                </a:solidFill>
+                <a:latin typeface="-윤고딕310" panose="02030504000101010101" pitchFamily="18" charset="-127"/>
+                <a:ea typeface="-윤고딕310" panose="02030504000101010101" pitchFamily="18" charset="-127"/>
+              </a:rPr>
+              <a:t>게임 프로그래밍</a:t>
+            </a:r>
+            <a:endParaRPr lang="ko-KR" altLang="en-US" dirty="0">
+              <a:solidFill>
+                <a:srgbClr val="C00000"/>
+              </a:solidFill>
+              <a:latin typeface="-윤고딕310" panose="02030504000101010101" pitchFamily="18" charset="-127"/>
+              <a:ea typeface="-윤고딕310" panose="02030504000101010101" pitchFamily="18" charset="-127"/>
+            </a:endParaRPr>
+          </a:p>
+        </p:txBody>
+      </p:sp>
+    </p:spTree>
+    <p:extLst>
+      <p:ext uri="{BB962C8B-B14F-4D97-AF65-F5344CB8AC3E}">
+        <p14:creationId xmlns:p14="http://schemas.microsoft.com/office/powerpoint/2010/main" val="362600760"/>
       </p:ext>
     </p:extLst>
   </p:cSld>

</xml_diff>